<commit_message>
SSSO & SSRO demo app update.
SSSO & SSRO demo app update.
</commit_message>
<xml_diff>
--- a/SSPS_Demo/NotEssentialData/custom images.pptx
+++ b/SSPS_Demo/NotEssentialData/custom images.pptx
@@ -6,6 +6,9 @@
   </p:sldMasterIdLst>
   <p:sldIdLst>
     <p:sldId id="256" r:id="rId2"/>
+    <p:sldId id="258" r:id="rId3"/>
+    <p:sldId id="257" r:id="rId4"/>
+    <p:sldId id="259" r:id="rId5"/>
   </p:sldIdLst>
   <p:sldSz cx="12192000" cy="6858000"/>
   <p:notesSz cx="6858000" cy="9144000"/>
@@ -259,7 +262,7 @@
           <a:p>
             <a:fld id="{47577C98-BE2A-4BDB-88A4-84A7CBC2977B}" type="datetimeFigureOut">
               <a:rPr lang="en-US" smtClean="0"/>
-              <a:t>5/23/2022</a:t>
+              <a:t>12/6/2022</a:t>
             </a:fld>
             <a:endParaRPr lang="en-US"/>
           </a:p>
@@ -457,7 +460,7 @@
           <a:p>
             <a:fld id="{47577C98-BE2A-4BDB-88A4-84A7CBC2977B}" type="datetimeFigureOut">
               <a:rPr lang="en-US" smtClean="0"/>
-              <a:t>5/23/2022</a:t>
+              <a:t>12/6/2022</a:t>
             </a:fld>
             <a:endParaRPr lang="en-US"/>
           </a:p>
@@ -665,7 +668,7 @@
           <a:p>
             <a:fld id="{47577C98-BE2A-4BDB-88A4-84A7CBC2977B}" type="datetimeFigureOut">
               <a:rPr lang="en-US" smtClean="0"/>
-              <a:t>5/23/2022</a:t>
+              <a:t>12/6/2022</a:t>
             </a:fld>
             <a:endParaRPr lang="en-US"/>
           </a:p>
@@ -863,7 +866,7 @@
           <a:p>
             <a:fld id="{47577C98-BE2A-4BDB-88A4-84A7CBC2977B}" type="datetimeFigureOut">
               <a:rPr lang="en-US" smtClean="0"/>
-              <a:t>5/23/2022</a:t>
+              <a:t>12/6/2022</a:t>
             </a:fld>
             <a:endParaRPr lang="en-US"/>
           </a:p>
@@ -1138,7 +1141,7 @@
           <a:p>
             <a:fld id="{47577C98-BE2A-4BDB-88A4-84A7CBC2977B}" type="datetimeFigureOut">
               <a:rPr lang="en-US" smtClean="0"/>
-              <a:t>5/23/2022</a:t>
+              <a:t>12/6/2022</a:t>
             </a:fld>
             <a:endParaRPr lang="en-US"/>
           </a:p>
@@ -1403,7 +1406,7 @@
           <a:p>
             <a:fld id="{47577C98-BE2A-4BDB-88A4-84A7CBC2977B}" type="datetimeFigureOut">
               <a:rPr lang="en-US" smtClean="0"/>
-              <a:t>5/23/2022</a:t>
+              <a:t>12/6/2022</a:t>
             </a:fld>
             <a:endParaRPr lang="en-US"/>
           </a:p>
@@ -1815,7 +1818,7 @@
           <a:p>
             <a:fld id="{47577C98-BE2A-4BDB-88A4-84A7CBC2977B}" type="datetimeFigureOut">
               <a:rPr lang="en-US" smtClean="0"/>
-              <a:t>5/23/2022</a:t>
+              <a:t>12/6/2022</a:t>
             </a:fld>
             <a:endParaRPr lang="en-US"/>
           </a:p>
@@ -1956,7 +1959,7 @@
           <a:p>
             <a:fld id="{47577C98-BE2A-4BDB-88A4-84A7CBC2977B}" type="datetimeFigureOut">
               <a:rPr lang="en-US" smtClean="0"/>
-              <a:t>5/23/2022</a:t>
+              <a:t>12/6/2022</a:t>
             </a:fld>
             <a:endParaRPr lang="en-US"/>
           </a:p>
@@ -2069,7 +2072,7 @@
           <a:p>
             <a:fld id="{47577C98-BE2A-4BDB-88A4-84A7CBC2977B}" type="datetimeFigureOut">
               <a:rPr lang="en-US" smtClean="0"/>
-              <a:t>5/23/2022</a:t>
+              <a:t>12/6/2022</a:t>
             </a:fld>
             <a:endParaRPr lang="en-US"/>
           </a:p>
@@ -2380,7 +2383,7 @@
           <a:p>
             <a:fld id="{47577C98-BE2A-4BDB-88A4-84A7CBC2977B}" type="datetimeFigureOut">
               <a:rPr lang="en-US" smtClean="0"/>
-              <a:t>5/23/2022</a:t>
+              <a:t>12/6/2022</a:t>
             </a:fld>
             <a:endParaRPr lang="en-US"/>
           </a:p>
@@ -2668,7 +2671,7 @@
           <a:p>
             <a:fld id="{47577C98-BE2A-4BDB-88A4-84A7CBC2977B}" type="datetimeFigureOut">
               <a:rPr lang="en-US" smtClean="0"/>
-              <a:t>5/23/2022</a:t>
+              <a:t>12/6/2022</a:t>
             </a:fld>
             <a:endParaRPr lang="en-US"/>
           </a:p>
@@ -2909,7 +2912,7 @@
           <a:p>
             <a:fld id="{47577C98-BE2A-4BDB-88A4-84A7CBC2977B}" type="datetimeFigureOut">
               <a:rPr lang="en-US" smtClean="0"/>
-              <a:t>5/23/2022</a:t>
+              <a:t>12/6/2022</a:t>
             </a:fld>
             <a:endParaRPr lang="en-US"/>
           </a:p>
@@ -4562,6 +4565,2092 @@
 </p:sld>
 </file>
 
+<file path=ppt/slides/slide2.xml><?xml version="1.0" encoding="utf-8"?>
+<p:sld xmlns:a="http://schemas.openxmlformats.org/drawingml/2006/main" xmlns:r="http://schemas.openxmlformats.org/officeDocument/2006/relationships" xmlns:p="http://schemas.openxmlformats.org/presentationml/2006/main">
+  <p:cSld>
+    <p:spTree>
+      <p:nvGrpSpPr>
+        <p:cNvPr id="1" name=""/>
+        <p:cNvGrpSpPr/>
+        <p:nvPr/>
+      </p:nvGrpSpPr>
+      <p:grpSpPr>
+        <a:xfrm>
+          <a:off x="0" y="0"/>
+          <a:ext cx="0" cy="0"/>
+          <a:chOff x="0" y="0"/>
+          <a:chExt cx="0" cy="0"/>
+        </a:xfrm>
+      </p:grpSpPr>
+      <p:sp>
+        <p:nvSpPr>
+          <p:cNvPr id="38" name="Rectangle 37">
+            <a:extLst>
+              <a:ext uri="{FF2B5EF4-FFF2-40B4-BE49-F238E27FC236}">
+                <a16:creationId xmlns:a16="http://schemas.microsoft.com/office/drawing/2014/main" id="{022ADCD4-7D47-49B4-A2CC-28A3E7D8AF0D}"/>
+              </a:ext>
+            </a:extLst>
+          </p:cNvPr>
+          <p:cNvSpPr/>
+          <p:nvPr/>
+        </p:nvSpPr>
+        <p:spPr>
+          <a:xfrm>
+            <a:off x="3379305" y="159026"/>
+            <a:ext cx="2073966" cy="2352261"/>
+          </a:xfrm>
+          <a:prstGeom prst="rect">
+            <a:avLst/>
+          </a:prstGeom>
+          <a:noFill/>
+          <a:ln w="38100">
+            <a:solidFill>
+              <a:schemeClr val="tx1"/>
+            </a:solidFill>
+          </a:ln>
+        </p:spPr>
+        <p:style>
+          <a:lnRef idx="2">
+            <a:schemeClr val="accent1">
+              <a:shade val="50000"/>
+            </a:schemeClr>
+          </a:lnRef>
+          <a:fillRef idx="1">
+            <a:schemeClr val="accent1"/>
+          </a:fillRef>
+          <a:effectRef idx="0">
+            <a:schemeClr val="accent1"/>
+          </a:effectRef>
+          <a:fontRef idx="minor">
+            <a:schemeClr val="lt1"/>
+          </a:fontRef>
+        </p:style>
+        <p:txBody>
+          <a:bodyPr rtlCol="0" anchor="ctr"/>
+          <a:lstStyle/>
+          <a:p>
+            <a:pPr algn="ctr"/>
+            <a:endParaRPr lang="en-US"/>
+          </a:p>
+        </p:txBody>
+      </p:sp>
+      <p:sp>
+        <p:nvSpPr>
+          <p:cNvPr id="7" name="TextBox 6">
+            <a:extLst>
+              <a:ext uri="{FF2B5EF4-FFF2-40B4-BE49-F238E27FC236}">
+                <a16:creationId xmlns:a16="http://schemas.microsoft.com/office/drawing/2014/main" id="{B65BC742-56C9-430C-852B-71F7089F9FCE}"/>
+              </a:ext>
+            </a:extLst>
+          </p:cNvPr>
+          <p:cNvSpPr txBox="1"/>
+          <p:nvPr/>
+        </p:nvSpPr>
+        <p:spPr>
+          <a:xfrm>
+            <a:off x="4261931" y="1154686"/>
+            <a:ext cx="308714" cy="523220"/>
+          </a:xfrm>
+          <a:prstGeom prst="rect">
+            <a:avLst/>
+          </a:prstGeom>
+          <a:noFill/>
+        </p:spPr>
+        <p:txBody>
+          <a:bodyPr wrap="square" rtlCol="0">
+            <a:spAutoFit/>
+          </a:bodyPr>
+          <a:lstStyle/>
+          <a:p>
+            <a:r>
+              <a:rPr lang="en-US" sz="2800" b="1" dirty="0"/>
+              <a:t>?</a:t>
+            </a:r>
+          </a:p>
+        </p:txBody>
+      </p:sp>
+      <p:sp>
+        <p:nvSpPr>
+          <p:cNvPr id="11" name="TextBox 10">
+            <a:extLst>
+              <a:ext uri="{FF2B5EF4-FFF2-40B4-BE49-F238E27FC236}">
+                <a16:creationId xmlns:a16="http://schemas.microsoft.com/office/drawing/2014/main" id="{39572287-2027-47B7-BA5A-1716C0E7EA29}"/>
+              </a:ext>
+            </a:extLst>
+          </p:cNvPr>
+          <p:cNvSpPr txBox="1"/>
+          <p:nvPr/>
+        </p:nvSpPr>
+        <p:spPr>
+          <a:xfrm>
+            <a:off x="3379306" y="159026"/>
+            <a:ext cx="2073965" cy="584775"/>
+          </a:xfrm>
+          <a:prstGeom prst="rect">
+            <a:avLst/>
+          </a:prstGeom>
+          <a:noFill/>
+        </p:spPr>
+        <p:txBody>
+          <a:bodyPr wrap="square" rtlCol="0">
+            <a:spAutoFit/>
+          </a:bodyPr>
+          <a:lstStyle/>
+          <a:p>
+            <a:pPr algn="ctr"/>
+            <a:r>
+              <a:rPr lang="en-US" sz="3200" dirty="0">
+                <a:latin typeface="Arial Black" panose="020B0A04020102020204" pitchFamily="34" charset="0"/>
+              </a:rPr>
+              <a:t>Legend</a:t>
+            </a:r>
+          </a:p>
+        </p:txBody>
+      </p:sp>
+    </p:spTree>
+    <p:extLst>
+      <p:ext uri="{BB962C8B-B14F-4D97-AF65-F5344CB8AC3E}">
+        <p14:creationId xmlns:p14="http://schemas.microsoft.com/office/powerpoint/2010/main" val="221084905"/>
+      </p:ext>
+    </p:extLst>
+  </p:cSld>
+  <p:clrMapOvr>
+    <a:masterClrMapping/>
+  </p:clrMapOvr>
+</p:sld>
+</file>
+
+<file path=ppt/slides/slide3.xml><?xml version="1.0" encoding="utf-8"?>
+<p:sld xmlns:a="http://schemas.openxmlformats.org/drawingml/2006/main" xmlns:r="http://schemas.openxmlformats.org/officeDocument/2006/relationships" xmlns:p="http://schemas.openxmlformats.org/presentationml/2006/main">
+  <p:cSld>
+    <p:spTree>
+      <p:nvGrpSpPr>
+        <p:cNvPr id="1" name=""/>
+        <p:cNvGrpSpPr/>
+        <p:nvPr/>
+      </p:nvGrpSpPr>
+      <p:grpSpPr>
+        <a:xfrm>
+          <a:off x="0" y="0"/>
+          <a:ext cx="0" cy="0"/>
+          <a:chOff x="0" y="0"/>
+          <a:chExt cx="0" cy="0"/>
+        </a:xfrm>
+      </p:grpSpPr>
+      <p:sp>
+        <p:nvSpPr>
+          <p:cNvPr id="4" name="Rectangle 3">
+            <a:extLst>
+              <a:ext uri="{FF2B5EF4-FFF2-40B4-BE49-F238E27FC236}">
+                <a16:creationId xmlns:a16="http://schemas.microsoft.com/office/drawing/2014/main" id="{13929E8A-744F-4860-89A1-F7370FC9F240}"/>
+              </a:ext>
+            </a:extLst>
+          </p:cNvPr>
+          <p:cNvSpPr/>
+          <p:nvPr/>
+        </p:nvSpPr>
+        <p:spPr>
+          <a:xfrm>
+            <a:off x="1796681" y="1029021"/>
+            <a:ext cx="3002761" cy="2923032"/>
+          </a:xfrm>
+          <a:prstGeom prst="rect">
+            <a:avLst/>
+          </a:prstGeom>
+          <a:solidFill>
+            <a:schemeClr val="bg1"/>
+          </a:solidFill>
+          <a:ln w="38100">
+            <a:solidFill>
+              <a:schemeClr val="tx1"/>
+            </a:solidFill>
+          </a:ln>
+        </p:spPr>
+        <p:style>
+          <a:lnRef idx="2">
+            <a:schemeClr val="accent1">
+              <a:shade val="50000"/>
+            </a:schemeClr>
+          </a:lnRef>
+          <a:fillRef idx="1">
+            <a:schemeClr val="accent1"/>
+          </a:fillRef>
+          <a:effectRef idx="0">
+            <a:schemeClr val="accent1"/>
+          </a:effectRef>
+          <a:fontRef idx="minor">
+            <a:schemeClr val="lt1"/>
+          </a:fontRef>
+        </p:style>
+        <p:txBody>
+          <a:bodyPr rtlCol="0" anchor="ctr"/>
+          <a:lstStyle>
+            <a:defPPr>
+              <a:defRPr lang="en-US"/>
+            </a:defPPr>
+            <a:lvl1pPr marL="0" algn="l" defTabSz="914400" rtl="0" eaLnBrk="1" latinLnBrk="0" hangingPunct="1">
+              <a:defRPr sz="1800" kern="1200">
+                <a:solidFill>
+                  <a:schemeClr val="lt1"/>
+                </a:solidFill>
+                <a:latin typeface="+mn-lt"/>
+                <a:ea typeface="+mn-ea"/>
+                <a:cs typeface="+mn-cs"/>
+              </a:defRPr>
+            </a:lvl1pPr>
+            <a:lvl2pPr marL="457200" algn="l" defTabSz="914400" rtl="0" eaLnBrk="1" latinLnBrk="0" hangingPunct="1">
+              <a:defRPr sz="1800" kern="1200">
+                <a:solidFill>
+                  <a:schemeClr val="lt1"/>
+                </a:solidFill>
+                <a:latin typeface="+mn-lt"/>
+                <a:ea typeface="+mn-ea"/>
+                <a:cs typeface="+mn-cs"/>
+              </a:defRPr>
+            </a:lvl2pPr>
+            <a:lvl3pPr marL="914400" algn="l" defTabSz="914400" rtl="0" eaLnBrk="1" latinLnBrk="0" hangingPunct="1">
+              <a:defRPr sz="1800" kern="1200">
+                <a:solidFill>
+                  <a:schemeClr val="lt1"/>
+                </a:solidFill>
+                <a:latin typeface="+mn-lt"/>
+                <a:ea typeface="+mn-ea"/>
+                <a:cs typeface="+mn-cs"/>
+              </a:defRPr>
+            </a:lvl3pPr>
+            <a:lvl4pPr marL="1371600" algn="l" defTabSz="914400" rtl="0" eaLnBrk="1" latinLnBrk="0" hangingPunct="1">
+              <a:defRPr sz="1800" kern="1200">
+                <a:solidFill>
+                  <a:schemeClr val="lt1"/>
+                </a:solidFill>
+                <a:latin typeface="+mn-lt"/>
+                <a:ea typeface="+mn-ea"/>
+                <a:cs typeface="+mn-cs"/>
+              </a:defRPr>
+            </a:lvl4pPr>
+            <a:lvl5pPr marL="1828800" algn="l" defTabSz="914400" rtl="0" eaLnBrk="1" latinLnBrk="0" hangingPunct="1">
+              <a:defRPr sz="1800" kern="1200">
+                <a:solidFill>
+                  <a:schemeClr val="lt1"/>
+                </a:solidFill>
+                <a:latin typeface="+mn-lt"/>
+                <a:ea typeface="+mn-ea"/>
+                <a:cs typeface="+mn-cs"/>
+              </a:defRPr>
+            </a:lvl5pPr>
+            <a:lvl6pPr marL="2286000" algn="l" defTabSz="914400" rtl="0" eaLnBrk="1" latinLnBrk="0" hangingPunct="1">
+              <a:defRPr sz="1800" kern="1200">
+                <a:solidFill>
+                  <a:schemeClr val="lt1"/>
+                </a:solidFill>
+                <a:latin typeface="+mn-lt"/>
+                <a:ea typeface="+mn-ea"/>
+                <a:cs typeface="+mn-cs"/>
+              </a:defRPr>
+            </a:lvl6pPr>
+            <a:lvl7pPr marL="2743200" algn="l" defTabSz="914400" rtl="0" eaLnBrk="1" latinLnBrk="0" hangingPunct="1">
+              <a:defRPr sz="1800" kern="1200">
+                <a:solidFill>
+                  <a:schemeClr val="lt1"/>
+                </a:solidFill>
+                <a:latin typeface="+mn-lt"/>
+                <a:ea typeface="+mn-ea"/>
+                <a:cs typeface="+mn-cs"/>
+              </a:defRPr>
+            </a:lvl7pPr>
+            <a:lvl8pPr marL="3200400" algn="l" defTabSz="914400" rtl="0" eaLnBrk="1" latinLnBrk="0" hangingPunct="1">
+              <a:defRPr sz="1800" kern="1200">
+                <a:solidFill>
+                  <a:schemeClr val="lt1"/>
+                </a:solidFill>
+                <a:latin typeface="+mn-lt"/>
+                <a:ea typeface="+mn-ea"/>
+                <a:cs typeface="+mn-cs"/>
+              </a:defRPr>
+            </a:lvl8pPr>
+            <a:lvl9pPr marL="3657600" algn="l" defTabSz="914400" rtl="0" eaLnBrk="1" latinLnBrk="0" hangingPunct="1">
+              <a:defRPr sz="1800" kern="1200">
+                <a:solidFill>
+                  <a:schemeClr val="lt1"/>
+                </a:solidFill>
+                <a:latin typeface="+mn-lt"/>
+                <a:ea typeface="+mn-ea"/>
+                <a:cs typeface="+mn-cs"/>
+              </a:defRPr>
+            </a:lvl9pPr>
+          </a:lstStyle>
+          <a:p>
+            <a:pPr algn="ctr"/>
+            <a:endParaRPr lang="en-US"/>
+          </a:p>
+        </p:txBody>
+      </p:sp>
+      <p:sp>
+        <p:nvSpPr>
+          <p:cNvPr id="5" name="Oval 4">
+            <a:extLst>
+              <a:ext uri="{FF2B5EF4-FFF2-40B4-BE49-F238E27FC236}">
+                <a16:creationId xmlns:a16="http://schemas.microsoft.com/office/drawing/2014/main" id="{1005F762-AF54-4C4A-B386-7C75ACB22422}"/>
+              </a:ext>
+            </a:extLst>
+          </p:cNvPr>
+          <p:cNvSpPr/>
+          <p:nvPr/>
+        </p:nvSpPr>
+        <p:spPr>
+          <a:xfrm>
+            <a:off x="2281956" y="2134493"/>
+            <a:ext cx="371856" cy="371856"/>
+          </a:xfrm>
+          <a:prstGeom prst="ellipse">
+            <a:avLst/>
+          </a:prstGeom>
+          <a:solidFill>
+            <a:srgbClr val="7030A0"/>
+          </a:solidFill>
+          <a:ln w="38100">
+            <a:solidFill>
+              <a:srgbClr val="7030A0"/>
+            </a:solidFill>
+          </a:ln>
+        </p:spPr>
+        <p:style>
+          <a:lnRef idx="2">
+            <a:schemeClr val="accent1">
+              <a:shade val="50000"/>
+            </a:schemeClr>
+          </a:lnRef>
+          <a:fillRef idx="1">
+            <a:schemeClr val="accent1"/>
+          </a:fillRef>
+          <a:effectRef idx="0">
+            <a:schemeClr val="accent1"/>
+          </a:effectRef>
+          <a:fontRef idx="minor">
+            <a:schemeClr val="lt1"/>
+          </a:fontRef>
+        </p:style>
+        <p:txBody>
+          <a:bodyPr rtlCol="0" anchor="ctr"/>
+          <a:lstStyle>
+            <a:defPPr>
+              <a:defRPr lang="en-US"/>
+            </a:defPPr>
+            <a:lvl1pPr marL="0" algn="l" defTabSz="914400" rtl="0" eaLnBrk="1" latinLnBrk="0" hangingPunct="1">
+              <a:defRPr sz="1800" kern="1200">
+                <a:solidFill>
+                  <a:schemeClr val="lt1"/>
+                </a:solidFill>
+                <a:latin typeface="+mn-lt"/>
+                <a:ea typeface="+mn-ea"/>
+                <a:cs typeface="+mn-cs"/>
+              </a:defRPr>
+            </a:lvl1pPr>
+            <a:lvl2pPr marL="457200" algn="l" defTabSz="914400" rtl="0" eaLnBrk="1" latinLnBrk="0" hangingPunct="1">
+              <a:defRPr sz="1800" kern="1200">
+                <a:solidFill>
+                  <a:schemeClr val="lt1"/>
+                </a:solidFill>
+                <a:latin typeface="+mn-lt"/>
+                <a:ea typeface="+mn-ea"/>
+                <a:cs typeface="+mn-cs"/>
+              </a:defRPr>
+            </a:lvl2pPr>
+            <a:lvl3pPr marL="914400" algn="l" defTabSz="914400" rtl="0" eaLnBrk="1" latinLnBrk="0" hangingPunct="1">
+              <a:defRPr sz="1800" kern="1200">
+                <a:solidFill>
+                  <a:schemeClr val="lt1"/>
+                </a:solidFill>
+                <a:latin typeface="+mn-lt"/>
+                <a:ea typeface="+mn-ea"/>
+                <a:cs typeface="+mn-cs"/>
+              </a:defRPr>
+            </a:lvl3pPr>
+            <a:lvl4pPr marL="1371600" algn="l" defTabSz="914400" rtl="0" eaLnBrk="1" latinLnBrk="0" hangingPunct="1">
+              <a:defRPr sz="1800" kern="1200">
+                <a:solidFill>
+                  <a:schemeClr val="lt1"/>
+                </a:solidFill>
+                <a:latin typeface="+mn-lt"/>
+                <a:ea typeface="+mn-ea"/>
+                <a:cs typeface="+mn-cs"/>
+              </a:defRPr>
+            </a:lvl4pPr>
+            <a:lvl5pPr marL="1828800" algn="l" defTabSz="914400" rtl="0" eaLnBrk="1" latinLnBrk="0" hangingPunct="1">
+              <a:defRPr sz="1800" kern="1200">
+                <a:solidFill>
+                  <a:schemeClr val="lt1"/>
+                </a:solidFill>
+                <a:latin typeface="+mn-lt"/>
+                <a:ea typeface="+mn-ea"/>
+                <a:cs typeface="+mn-cs"/>
+              </a:defRPr>
+            </a:lvl5pPr>
+            <a:lvl6pPr marL="2286000" algn="l" defTabSz="914400" rtl="0" eaLnBrk="1" latinLnBrk="0" hangingPunct="1">
+              <a:defRPr sz="1800" kern="1200">
+                <a:solidFill>
+                  <a:schemeClr val="lt1"/>
+                </a:solidFill>
+                <a:latin typeface="+mn-lt"/>
+                <a:ea typeface="+mn-ea"/>
+                <a:cs typeface="+mn-cs"/>
+              </a:defRPr>
+            </a:lvl6pPr>
+            <a:lvl7pPr marL="2743200" algn="l" defTabSz="914400" rtl="0" eaLnBrk="1" latinLnBrk="0" hangingPunct="1">
+              <a:defRPr sz="1800" kern="1200">
+                <a:solidFill>
+                  <a:schemeClr val="lt1"/>
+                </a:solidFill>
+                <a:latin typeface="+mn-lt"/>
+                <a:ea typeface="+mn-ea"/>
+                <a:cs typeface="+mn-cs"/>
+              </a:defRPr>
+            </a:lvl7pPr>
+            <a:lvl8pPr marL="3200400" algn="l" defTabSz="914400" rtl="0" eaLnBrk="1" latinLnBrk="0" hangingPunct="1">
+              <a:defRPr sz="1800" kern="1200">
+                <a:solidFill>
+                  <a:schemeClr val="lt1"/>
+                </a:solidFill>
+                <a:latin typeface="+mn-lt"/>
+                <a:ea typeface="+mn-ea"/>
+                <a:cs typeface="+mn-cs"/>
+              </a:defRPr>
+            </a:lvl8pPr>
+            <a:lvl9pPr marL="3657600" algn="l" defTabSz="914400" rtl="0" eaLnBrk="1" latinLnBrk="0" hangingPunct="1">
+              <a:defRPr sz="1800" kern="1200">
+                <a:solidFill>
+                  <a:schemeClr val="lt1"/>
+                </a:solidFill>
+                <a:latin typeface="+mn-lt"/>
+                <a:ea typeface="+mn-ea"/>
+                <a:cs typeface="+mn-cs"/>
+              </a:defRPr>
+            </a:lvl9pPr>
+          </a:lstStyle>
+          <a:p>
+            <a:pPr algn="ctr"/>
+            <a:endParaRPr lang="en-US" dirty="0">
+              <a:solidFill>
+                <a:srgbClr val="FF6565"/>
+              </a:solidFill>
+            </a:endParaRPr>
+          </a:p>
+        </p:txBody>
+      </p:sp>
+      <p:sp>
+        <p:nvSpPr>
+          <p:cNvPr id="6" name="TextBox 10">
+            <a:extLst>
+              <a:ext uri="{FF2B5EF4-FFF2-40B4-BE49-F238E27FC236}">
+                <a16:creationId xmlns:a16="http://schemas.microsoft.com/office/drawing/2014/main" id="{EDA16992-9472-49CE-B254-9F8385A66CB9}"/>
+              </a:ext>
+            </a:extLst>
+          </p:cNvPr>
+          <p:cNvSpPr txBox="1"/>
+          <p:nvPr/>
+        </p:nvSpPr>
+        <p:spPr>
+          <a:xfrm>
+            <a:off x="2653812" y="2106239"/>
+            <a:ext cx="1640304" cy="400110"/>
+          </a:xfrm>
+          <a:prstGeom prst="rect">
+            <a:avLst/>
+          </a:prstGeom>
+          <a:noFill/>
+        </p:spPr>
+        <p:txBody>
+          <a:bodyPr wrap="square" rtlCol="0">
+            <a:spAutoFit/>
+          </a:bodyPr>
+          <a:lstStyle>
+            <a:defPPr>
+              <a:defRPr lang="en-US"/>
+            </a:defPPr>
+            <a:lvl1pPr marL="0" algn="l" defTabSz="914400" rtl="0" eaLnBrk="1" latinLnBrk="0" hangingPunct="1">
+              <a:defRPr sz="1800" kern="1200">
+                <a:solidFill>
+                  <a:schemeClr val="tx1"/>
+                </a:solidFill>
+                <a:latin typeface="+mn-lt"/>
+                <a:ea typeface="+mn-ea"/>
+                <a:cs typeface="+mn-cs"/>
+              </a:defRPr>
+            </a:lvl1pPr>
+            <a:lvl2pPr marL="457200" algn="l" defTabSz="914400" rtl="0" eaLnBrk="1" latinLnBrk="0" hangingPunct="1">
+              <a:defRPr sz="1800" kern="1200">
+                <a:solidFill>
+                  <a:schemeClr val="tx1"/>
+                </a:solidFill>
+                <a:latin typeface="+mn-lt"/>
+                <a:ea typeface="+mn-ea"/>
+                <a:cs typeface="+mn-cs"/>
+              </a:defRPr>
+            </a:lvl2pPr>
+            <a:lvl3pPr marL="914400" algn="l" defTabSz="914400" rtl="0" eaLnBrk="1" latinLnBrk="0" hangingPunct="1">
+              <a:defRPr sz="1800" kern="1200">
+                <a:solidFill>
+                  <a:schemeClr val="tx1"/>
+                </a:solidFill>
+                <a:latin typeface="+mn-lt"/>
+                <a:ea typeface="+mn-ea"/>
+                <a:cs typeface="+mn-cs"/>
+              </a:defRPr>
+            </a:lvl3pPr>
+            <a:lvl4pPr marL="1371600" algn="l" defTabSz="914400" rtl="0" eaLnBrk="1" latinLnBrk="0" hangingPunct="1">
+              <a:defRPr sz="1800" kern="1200">
+                <a:solidFill>
+                  <a:schemeClr val="tx1"/>
+                </a:solidFill>
+                <a:latin typeface="+mn-lt"/>
+                <a:ea typeface="+mn-ea"/>
+                <a:cs typeface="+mn-cs"/>
+              </a:defRPr>
+            </a:lvl4pPr>
+            <a:lvl5pPr marL="1828800" algn="l" defTabSz="914400" rtl="0" eaLnBrk="1" latinLnBrk="0" hangingPunct="1">
+              <a:defRPr sz="1800" kern="1200">
+                <a:solidFill>
+                  <a:schemeClr val="tx1"/>
+                </a:solidFill>
+                <a:latin typeface="+mn-lt"/>
+                <a:ea typeface="+mn-ea"/>
+                <a:cs typeface="+mn-cs"/>
+              </a:defRPr>
+            </a:lvl5pPr>
+            <a:lvl6pPr marL="2286000" algn="l" defTabSz="914400" rtl="0" eaLnBrk="1" latinLnBrk="0" hangingPunct="1">
+              <a:defRPr sz="1800" kern="1200">
+                <a:solidFill>
+                  <a:schemeClr val="tx1"/>
+                </a:solidFill>
+                <a:latin typeface="+mn-lt"/>
+                <a:ea typeface="+mn-ea"/>
+                <a:cs typeface="+mn-cs"/>
+              </a:defRPr>
+            </a:lvl6pPr>
+            <a:lvl7pPr marL="2743200" algn="l" defTabSz="914400" rtl="0" eaLnBrk="1" latinLnBrk="0" hangingPunct="1">
+              <a:defRPr sz="1800" kern="1200">
+                <a:solidFill>
+                  <a:schemeClr val="tx1"/>
+                </a:solidFill>
+                <a:latin typeface="+mn-lt"/>
+                <a:ea typeface="+mn-ea"/>
+                <a:cs typeface="+mn-cs"/>
+              </a:defRPr>
+            </a:lvl7pPr>
+            <a:lvl8pPr marL="3200400" algn="l" defTabSz="914400" rtl="0" eaLnBrk="1" latinLnBrk="0" hangingPunct="1">
+              <a:defRPr sz="1800" kern="1200">
+                <a:solidFill>
+                  <a:schemeClr val="tx1"/>
+                </a:solidFill>
+                <a:latin typeface="+mn-lt"/>
+                <a:ea typeface="+mn-ea"/>
+                <a:cs typeface="+mn-cs"/>
+              </a:defRPr>
+            </a:lvl8pPr>
+            <a:lvl9pPr marL="3657600" algn="l" defTabSz="914400" rtl="0" eaLnBrk="1" latinLnBrk="0" hangingPunct="1">
+              <a:defRPr sz="1800" kern="1200">
+                <a:solidFill>
+                  <a:schemeClr val="tx1"/>
+                </a:solidFill>
+                <a:latin typeface="+mn-lt"/>
+                <a:ea typeface="+mn-ea"/>
+                <a:cs typeface="+mn-cs"/>
+              </a:defRPr>
+            </a:lvl9pPr>
+          </a:lstStyle>
+          <a:p>
+            <a:r>
+              <a:rPr lang="en-US" sz="2000" b="1" dirty="0"/>
+              <a:t>Groundwater</a:t>
+            </a:r>
+          </a:p>
+        </p:txBody>
+      </p:sp>
+      <p:sp>
+        <p:nvSpPr>
+          <p:cNvPr id="7" name="TextBox 15">
+            <a:extLst>
+              <a:ext uri="{FF2B5EF4-FFF2-40B4-BE49-F238E27FC236}">
+                <a16:creationId xmlns:a16="http://schemas.microsoft.com/office/drawing/2014/main" id="{84BCE48D-1058-44F6-B615-EDF724AA8FDF}"/>
+              </a:ext>
+            </a:extLst>
+          </p:cNvPr>
+          <p:cNvSpPr txBox="1"/>
+          <p:nvPr/>
+        </p:nvSpPr>
+        <p:spPr>
+          <a:xfrm>
+            <a:off x="1797838" y="1029021"/>
+            <a:ext cx="3002761" cy="1077218"/>
+          </a:xfrm>
+          <a:prstGeom prst="rect">
+            <a:avLst/>
+          </a:prstGeom>
+          <a:noFill/>
+        </p:spPr>
+        <p:txBody>
+          <a:bodyPr wrap="square" rtlCol="0">
+            <a:spAutoFit/>
+          </a:bodyPr>
+          <a:lstStyle>
+            <a:defPPr>
+              <a:defRPr lang="en-US"/>
+            </a:defPPr>
+            <a:lvl1pPr marL="0" algn="l" defTabSz="914400" rtl="0" eaLnBrk="1" latinLnBrk="0" hangingPunct="1">
+              <a:defRPr sz="1800" kern="1200">
+                <a:solidFill>
+                  <a:schemeClr val="tx1"/>
+                </a:solidFill>
+                <a:latin typeface="+mn-lt"/>
+                <a:ea typeface="+mn-ea"/>
+                <a:cs typeface="+mn-cs"/>
+              </a:defRPr>
+            </a:lvl1pPr>
+            <a:lvl2pPr marL="457200" algn="l" defTabSz="914400" rtl="0" eaLnBrk="1" latinLnBrk="0" hangingPunct="1">
+              <a:defRPr sz="1800" kern="1200">
+                <a:solidFill>
+                  <a:schemeClr val="tx1"/>
+                </a:solidFill>
+                <a:latin typeface="+mn-lt"/>
+                <a:ea typeface="+mn-ea"/>
+                <a:cs typeface="+mn-cs"/>
+              </a:defRPr>
+            </a:lvl2pPr>
+            <a:lvl3pPr marL="914400" algn="l" defTabSz="914400" rtl="0" eaLnBrk="1" latinLnBrk="0" hangingPunct="1">
+              <a:defRPr sz="1800" kern="1200">
+                <a:solidFill>
+                  <a:schemeClr val="tx1"/>
+                </a:solidFill>
+                <a:latin typeface="+mn-lt"/>
+                <a:ea typeface="+mn-ea"/>
+                <a:cs typeface="+mn-cs"/>
+              </a:defRPr>
+            </a:lvl3pPr>
+            <a:lvl4pPr marL="1371600" algn="l" defTabSz="914400" rtl="0" eaLnBrk="1" latinLnBrk="0" hangingPunct="1">
+              <a:defRPr sz="1800" kern="1200">
+                <a:solidFill>
+                  <a:schemeClr val="tx1"/>
+                </a:solidFill>
+                <a:latin typeface="+mn-lt"/>
+                <a:ea typeface="+mn-ea"/>
+                <a:cs typeface="+mn-cs"/>
+              </a:defRPr>
+            </a:lvl4pPr>
+            <a:lvl5pPr marL="1828800" algn="l" defTabSz="914400" rtl="0" eaLnBrk="1" latinLnBrk="0" hangingPunct="1">
+              <a:defRPr sz="1800" kern="1200">
+                <a:solidFill>
+                  <a:schemeClr val="tx1"/>
+                </a:solidFill>
+                <a:latin typeface="+mn-lt"/>
+                <a:ea typeface="+mn-ea"/>
+                <a:cs typeface="+mn-cs"/>
+              </a:defRPr>
+            </a:lvl5pPr>
+            <a:lvl6pPr marL="2286000" algn="l" defTabSz="914400" rtl="0" eaLnBrk="1" latinLnBrk="0" hangingPunct="1">
+              <a:defRPr sz="1800" kern="1200">
+                <a:solidFill>
+                  <a:schemeClr val="tx1"/>
+                </a:solidFill>
+                <a:latin typeface="+mn-lt"/>
+                <a:ea typeface="+mn-ea"/>
+                <a:cs typeface="+mn-cs"/>
+              </a:defRPr>
+            </a:lvl6pPr>
+            <a:lvl7pPr marL="2743200" algn="l" defTabSz="914400" rtl="0" eaLnBrk="1" latinLnBrk="0" hangingPunct="1">
+              <a:defRPr sz="1800" kern="1200">
+                <a:solidFill>
+                  <a:schemeClr val="tx1"/>
+                </a:solidFill>
+                <a:latin typeface="+mn-lt"/>
+                <a:ea typeface="+mn-ea"/>
+                <a:cs typeface="+mn-cs"/>
+              </a:defRPr>
+            </a:lvl7pPr>
+            <a:lvl8pPr marL="3200400" algn="l" defTabSz="914400" rtl="0" eaLnBrk="1" latinLnBrk="0" hangingPunct="1">
+              <a:defRPr sz="1800" kern="1200">
+                <a:solidFill>
+                  <a:schemeClr val="tx1"/>
+                </a:solidFill>
+                <a:latin typeface="+mn-lt"/>
+                <a:ea typeface="+mn-ea"/>
+                <a:cs typeface="+mn-cs"/>
+              </a:defRPr>
+            </a:lvl8pPr>
+            <a:lvl9pPr marL="3657600" algn="l" defTabSz="914400" rtl="0" eaLnBrk="1" latinLnBrk="0" hangingPunct="1">
+              <a:defRPr sz="1800" kern="1200">
+                <a:solidFill>
+                  <a:schemeClr val="tx1"/>
+                </a:solidFill>
+                <a:latin typeface="+mn-lt"/>
+                <a:ea typeface="+mn-ea"/>
+                <a:cs typeface="+mn-cs"/>
+              </a:defRPr>
+            </a:lvl9pPr>
+          </a:lstStyle>
+          <a:p>
+            <a:pPr algn="ctr"/>
+            <a:r>
+              <a:rPr lang="en-US" sz="3200" dirty="0">
+                <a:latin typeface="Arial Black" panose="020B0A04020102020204" pitchFamily="34" charset="0"/>
+              </a:rPr>
+              <a:t>Water Source Type</a:t>
+            </a:r>
+          </a:p>
+        </p:txBody>
+      </p:sp>
+      <p:sp>
+        <p:nvSpPr>
+          <p:cNvPr id="8" name="Oval 7">
+            <a:extLst>
+              <a:ext uri="{FF2B5EF4-FFF2-40B4-BE49-F238E27FC236}">
+                <a16:creationId xmlns:a16="http://schemas.microsoft.com/office/drawing/2014/main" id="{008950F2-9CBA-4AA7-9C49-986A65034666}"/>
+              </a:ext>
+            </a:extLst>
+          </p:cNvPr>
+          <p:cNvSpPr/>
+          <p:nvPr/>
+        </p:nvSpPr>
+        <p:spPr>
+          <a:xfrm>
+            <a:off x="2281956" y="2743741"/>
+            <a:ext cx="371856" cy="371856"/>
+          </a:xfrm>
+          <a:prstGeom prst="ellipse">
+            <a:avLst/>
+          </a:prstGeom>
+          <a:solidFill>
+            <a:srgbClr val="002F8E">
+              <a:alpha val="69804"/>
+            </a:srgbClr>
+          </a:solidFill>
+          <a:ln w="38100">
+            <a:noFill/>
+          </a:ln>
+        </p:spPr>
+        <p:style>
+          <a:lnRef idx="2">
+            <a:schemeClr val="accent1">
+              <a:shade val="50000"/>
+            </a:schemeClr>
+          </a:lnRef>
+          <a:fillRef idx="1">
+            <a:schemeClr val="accent1"/>
+          </a:fillRef>
+          <a:effectRef idx="0">
+            <a:schemeClr val="accent1"/>
+          </a:effectRef>
+          <a:fontRef idx="minor">
+            <a:schemeClr val="lt1"/>
+          </a:fontRef>
+        </p:style>
+        <p:txBody>
+          <a:bodyPr rtlCol="0" anchor="ctr"/>
+          <a:lstStyle>
+            <a:defPPr>
+              <a:defRPr lang="en-US"/>
+            </a:defPPr>
+            <a:lvl1pPr marL="0" algn="l" defTabSz="914400" rtl="0" eaLnBrk="1" latinLnBrk="0" hangingPunct="1">
+              <a:defRPr sz="1800" kern="1200">
+                <a:solidFill>
+                  <a:schemeClr val="lt1"/>
+                </a:solidFill>
+                <a:latin typeface="+mn-lt"/>
+                <a:ea typeface="+mn-ea"/>
+                <a:cs typeface="+mn-cs"/>
+              </a:defRPr>
+            </a:lvl1pPr>
+            <a:lvl2pPr marL="457200" algn="l" defTabSz="914400" rtl="0" eaLnBrk="1" latinLnBrk="0" hangingPunct="1">
+              <a:defRPr sz="1800" kern="1200">
+                <a:solidFill>
+                  <a:schemeClr val="lt1"/>
+                </a:solidFill>
+                <a:latin typeface="+mn-lt"/>
+                <a:ea typeface="+mn-ea"/>
+                <a:cs typeface="+mn-cs"/>
+              </a:defRPr>
+            </a:lvl2pPr>
+            <a:lvl3pPr marL="914400" algn="l" defTabSz="914400" rtl="0" eaLnBrk="1" latinLnBrk="0" hangingPunct="1">
+              <a:defRPr sz="1800" kern="1200">
+                <a:solidFill>
+                  <a:schemeClr val="lt1"/>
+                </a:solidFill>
+                <a:latin typeface="+mn-lt"/>
+                <a:ea typeface="+mn-ea"/>
+                <a:cs typeface="+mn-cs"/>
+              </a:defRPr>
+            </a:lvl3pPr>
+            <a:lvl4pPr marL="1371600" algn="l" defTabSz="914400" rtl="0" eaLnBrk="1" latinLnBrk="0" hangingPunct="1">
+              <a:defRPr sz="1800" kern="1200">
+                <a:solidFill>
+                  <a:schemeClr val="lt1"/>
+                </a:solidFill>
+                <a:latin typeface="+mn-lt"/>
+                <a:ea typeface="+mn-ea"/>
+                <a:cs typeface="+mn-cs"/>
+              </a:defRPr>
+            </a:lvl4pPr>
+            <a:lvl5pPr marL="1828800" algn="l" defTabSz="914400" rtl="0" eaLnBrk="1" latinLnBrk="0" hangingPunct="1">
+              <a:defRPr sz="1800" kern="1200">
+                <a:solidFill>
+                  <a:schemeClr val="lt1"/>
+                </a:solidFill>
+                <a:latin typeface="+mn-lt"/>
+                <a:ea typeface="+mn-ea"/>
+                <a:cs typeface="+mn-cs"/>
+              </a:defRPr>
+            </a:lvl5pPr>
+            <a:lvl6pPr marL="2286000" algn="l" defTabSz="914400" rtl="0" eaLnBrk="1" latinLnBrk="0" hangingPunct="1">
+              <a:defRPr sz="1800" kern="1200">
+                <a:solidFill>
+                  <a:schemeClr val="lt1"/>
+                </a:solidFill>
+                <a:latin typeface="+mn-lt"/>
+                <a:ea typeface="+mn-ea"/>
+                <a:cs typeface="+mn-cs"/>
+              </a:defRPr>
+            </a:lvl6pPr>
+            <a:lvl7pPr marL="2743200" algn="l" defTabSz="914400" rtl="0" eaLnBrk="1" latinLnBrk="0" hangingPunct="1">
+              <a:defRPr sz="1800" kern="1200">
+                <a:solidFill>
+                  <a:schemeClr val="lt1"/>
+                </a:solidFill>
+                <a:latin typeface="+mn-lt"/>
+                <a:ea typeface="+mn-ea"/>
+                <a:cs typeface="+mn-cs"/>
+              </a:defRPr>
+            </a:lvl7pPr>
+            <a:lvl8pPr marL="3200400" algn="l" defTabSz="914400" rtl="0" eaLnBrk="1" latinLnBrk="0" hangingPunct="1">
+              <a:defRPr sz="1800" kern="1200">
+                <a:solidFill>
+                  <a:schemeClr val="lt1"/>
+                </a:solidFill>
+                <a:latin typeface="+mn-lt"/>
+                <a:ea typeface="+mn-ea"/>
+                <a:cs typeface="+mn-cs"/>
+              </a:defRPr>
+            </a:lvl8pPr>
+            <a:lvl9pPr marL="3657600" algn="l" defTabSz="914400" rtl="0" eaLnBrk="1" latinLnBrk="0" hangingPunct="1">
+              <a:defRPr sz="1800" kern="1200">
+                <a:solidFill>
+                  <a:schemeClr val="lt1"/>
+                </a:solidFill>
+                <a:latin typeface="+mn-lt"/>
+                <a:ea typeface="+mn-ea"/>
+                <a:cs typeface="+mn-cs"/>
+              </a:defRPr>
+            </a:lvl9pPr>
+          </a:lstStyle>
+          <a:p>
+            <a:pPr algn="ctr"/>
+            <a:endParaRPr lang="en-US" dirty="0">
+              <a:solidFill>
+                <a:srgbClr val="FF6565"/>
+              </a:solidFill>
+            </a:endParaRPr>
+          </a:p>
+        </p:txBody>
+      </p:sp>
+      <p:sp>
+        <p:nvSpPr>
+          <p:cNvPr id="9" name="TextBox 17">
+            <a:extLst>
+              <a:ext uri="{FF2B5EF4-FFF2-40B4-BE49-F238E27FC236}">
+                <a16:creationId xmlns:a16="http://schemas.microsoft.com/office/drawing/2014/main" id="{DAFB449A-8A63-4ADB-89D7-EC4CCF118C5C}"/>
+              </a:ext>
+            </a:extLst>
+          </p:cNvPr>
+          <p:cNvSpPr txBox="1"/>
+          <p:nvPr/>
+        </p:nvSpPr>
+        <p:spPr>
+          <a:xfrm>
+            <a:off x="2653811" y="2715487"/>
+            <a:ext cx="1701621" cy="400110"/>
+          </a:xfrm>
+          <a:prstGeom prst="rect">
+            <a:avLst/>
+          </a:prstGeom>
+          <a:noFill/>
+        </p:spPr>
+        <p:txBody>
+          <a:bodyPr wrap="square" rtlCol="0">
+            <a:spAutoFit/>
+          </a:bodyPr>
+          <a:lstStyle>
+            <a:defPPr>
+              <a:defRPr lang="en-US"/>
+            </a:defPPr>
+            <a:lvl1pPr marL="0" algn="l" defTabSz="914400" rtl="0" eaLnBrk="1" latinLnBrk="0" hangingPunct="1">
+              <a:defRPr sz="1800" kern="1200">
+                <a:solidFill>
+                  <a:schemeClr val="tx1"/>
+                </a:solidFill>
+                <a:latin typeface="+mn-lt"/>
+                <a:ea typeface="+mn-ea"/>
+                <a:cs typeface="+mn-cs"/>
+              </a:defRPr>
+            </a:lvl1pPr>
+            <a:lvl2pPr marL="457200" algn="l" defTabSz="914400" rtl="0" eaLnBrk="1" latinLnBrk="0" hangingPunct="1">
+              <a:defRPr sz="1800" kern="1200">
+                <a:solidFill>
+                  <a:schemeClr val="tx1"/>
+                </a:solidFill>
+                <a:latin typeface="+mn-lt"/>
+                <a:ea typeface="+mn-ea"/>
+                <a:cs typeface="+mn-cs"/>
+              </a:defRPr>
+            </a:lvl2pPr>
+            <a:lvl3pPr marL="914400" algn="l" defTabSz="914400" rtl="0" eaLnBrk="1" latinLnBrk="0" hangingPunct="1">
+              <a:defRPr sz="1800" kern="1200">
+                <a:solidFill>
+                  <a:schemeClr val="tx1"/>
+                </a:solidFill>
+                <a:latin typeface="+mn-lt"/>
+                <a:ea typeface="+mn-ea"/>
+                <a:cs typeface="+mn-cs"/>
+              </a:defRPr>
+            </a:lvl3pPr>
+            <a:lvl4pPr marL="1371600" algn="l" defTabSz="914400" rtl="0" eaLnBrk="1" latinLnBrk="0" hangingPunct="1">
+              <a:defRPr sz="1800" kern="1200">
+                <a:solidFill>
+                  <a:schemeClr val="tx1"/>
+                </a:solidFill>
+                <a:latin typeface="+mn-lt"/>
+                <a:ea typeface="+mn-ea"/>
+                <a:cs typeface="+mn-cs"/>
+              </a:defRPr>
+            </a:lvl4pPr>
+            <a:lvl5pPr marL="1828800" algn="l" defTabSz="914400" rtl="0" eaLnBrk="1" latinLnBrk="0" hangingPunct="1">
+              <a:defRPr sz="1800" kern="1200">
+                <a:solidFill>
+                  <a:schemeClr val="tx1"/>
+                </a:solidFill>
+                <a:latin typeface="+mn-lt"/>
+                <a:ea typeface="+mn-ea"/>
+                <a:cs typeface="+mn-cs"/>
+              </a:defRPr>
+            </a:lvl5pPr>
+            <a:lvl6pPr marL="2286000" algn="l" defTabSz="914400" rtl="0" eaLnBrk="1" latinLnBrk="0" hangingPunct="1">
+              <a:defRPr sz="1800" kern="1200">
+                <a:solidFill>
+                  <a:schemeClr val="tx1"/>
+                </a:solidFill>
+                <a:latin typeface="+mn-lt"/>
+                <a:ea typeface="+mn-ea"/>
+                <a:cs typeface="+mn-cs"/>
+              </a:defRPr>
+            </a:lvl6pPr>
+            <a:lvl7pPr marL="2743200" algn="l" defTabSz="914400" rtl="0" eaLnBrk="1" latinLnBrk="0" hangingPunct="1">
+              <a:defRPr sz="1800" kern="1200">
+                <a:solidFill>
+                  <a:schemeClr val="tx1"/>
+                </a:solidFill>
+                <a:latin typeface="+mn-lt"/>
+                <a:ea typeface="+mn-ea"/>
+                <a:cs typeface="+mn-cs"/>
+              </a:defRPr>
+            </a:lvl7pPr>
+            <a:lvl8pPr marL="3200400" algn="l" defTabSz="914400" rtl="0" eaLnBrk="1" latinLnBrk="0" hangingPunct="1">
+              <a:defRPr sz="1800" kern="1200">
+                <a:solidFill>
+                  <a:schemeClr val="tx1"/>
+                </a:solidFill>
+                <a:latin typeface="+mn-lt"/>
+                <a:ea typeface="+mn-ea"/>
+                <a:cs typeface="+mn-cs"/>
+              </a:defRPr>
+            </a:lvl8pPr>
+            <a:lvl9pPr marL="3657600" algn="l" defTabSz="914400" rtl="0" eaLnBrk="1" latinLnBrk="0" hangingPunct="1">
+              <a:defRPr sz="1800" kern="1200">
+                <a:solidFill>
+                  <a:schemeClr val="tx1"/>
+                </a:solidFill>
+                <a:latin typeface="+mn-lt"/>
+                <a:ea typeface="+mn-ea"/>
+                <a:cs typeface="+mn-cs"/>
+              </a:defRPr>
+            </a:lvl9pPr>
+          </a:lstStyle>
+          <a:p>
+            <a:r>
+              <a:rPr lang="en-US" sz="2000" b="1" dirty="0"/>
+              <a:t>Surface Water</a:t>
+            </a:r>
+          </a:p>
+        </p:txBody>
+      </p:sp>
+      <p:sp>
+        <p:nvSpPr>
+          <p:cNvPr id="10" name="Oval 9">
+            <a:extLst>
+              <a:ext uri="{FF2B5EF4-FFF2-40B4-BE49-F238E27FC236}">
+                <a16:creationId xmlns:a16="http://schemas.microsoft.com/office/drawing/2014/main" id="{54B56B93-030D-4796-82B9-ECBC85753DEC}"/>
+              </a:ext>
+            </a:extLst>
+          </p:cNvPr>
+          <p:cNvSpPr/>
+          <p:nvPr/>
+        </p:nvSpPr>
+        <p:spPr>
+          <a:xfrm>
+            <a:off x="2281956" y="3305687"/>
+            <a:ext cx="371856" cy="371856"/>
+          </a:xfrm>
+          <a:prstGeom prst="ellipse">
+            <a:avLst/>
+          </a:prstGeom>
+          <a:solidFill>
+            <a:schemeClr val="bg1">
+              <a:lumMod val="75000"/>
+            </a:schemeClr>
+          </a:solidFill>
+          <a:ln w="38100">
+            <a:solidFill>
+              <a:schemeClr val="bg1">
+                <a:lumMod val="75000"/>
+              </a:schemeClr>
+            </a:solidFill>
+          </a:ln>
+        </p:spPr>
+        <p:style>
+          <a:lnRef idx="2">
+            <a:schemeClr val="accent1">
+              <a:shade val="50000"/>
+            </a:schemeClr>
+          </a:lnRef>
+          <a:fillRef idx="1">
+            <a:schemeClr val="accent1"/>
+          </a:fillRef>
+          <a:effectRef idx="0">
+            <a:schemeClr val="accent1"/>
+          </a:effectRef>
+          <a:fontRef idx="minor">
+            <a:schemeClr val="lt1"/>
+          </a:fontRef>
+        </p:style>
+        <p:txBody>
+          <a:bodyPr rtlCol="0" anchor="ctr"/>
+          <a:lstStyle>
+            <a:defPPr>
+              <a:defRPr lang="en-US"/>
+            </a:defPPr>
+            <a:lvl1pPr marL="0" algn="l" defTabSz="914400" rtl="0" eaLnBrk="1" latinLnBrk="0" hangingPunct="1">
+              <a:defRPr sz="1800" kern="1200">
+                <a:solidFill>
+                  <a:schemeClr val="lt1"/>
+                </a:solidFill>
+                <a:latin typeface="+mn-lt"/>
+                <a:ea typeface="+mn-ea"/>
+                <a:cs typeface="+mn-cs"/>
+              </a:defRPr>
+            </a:lvl1pPr>
+            <a:lvl2pPr marL="457200" algn="l" defTabSz="914400" rtl="0" eaLnBrk="1" latinLnBrk="0" hangingPunct="1">
+              <a:defRPr sz="1800" kern="1200">
+                <a:solidFill>
+                  <a:schemeClr val="lt1"/>
+                </a:solidFill>
+                <a:latin typeface="+mn-lt"/>
+                <a:ea typeface="+mn-ea"/>
+                <a:cs typeface="+mn-cs"/>
+              </a:defRPr>
+            </a:lvl2pPr>
+            <a:lvl3pPr marL="914400" algn="l" defTabSz="914400" rtl="0" eaLnBrk="1" latinLnBrk="0" hangingPunct="1">
+              <a:defRPr sz="1800" kern="1200">
+                <a:solidFill>
+                  <a:schemeClr val="lt1"/>
+                </a:solidFill>
+                <a:latin typeface="+mn-lt"/>
+                <a:ea typeface="+mn-ea"/>
+                <a:cs typeface="+mn-cs"/>
+              </a:defRPr>
+            </a:lvl3pPr>
+            <a:lvl4pPr marL="1371600" algn="l" defTabSz="914400" rtl="0" eaLnBrk="1" latinLnBrk="0" hangingPunct="1">
+              <a:defRPr sz="1800" kern="1200">
+                <a:solidFill>
+                  <a:schemeClr val="lt1"/>
+                </a:solidFill>
+                <a:latin typeface="+mn-lt"/>
+                <a:ea typeface="+mn-ea"/>
+                <a:cs typeface="+mn-cs"/>
+              </a:defRPr>
+            </a:lvl4pPr>
+            <a:lvl5pPr marL="1828800" algn="l" defTabSz="914400" rtl="0" eaLnBrk="1" latinLnBrk="0" hangingPunct="1">
+              <a:defRPr sz="1800" kern="1200">
+                <a:solidFill>
+                  <a:schemeClr val="lt1"/>
+                </a:solidFill>
+                <a:latin typeface="+mn-lt"/>
+                <a:ea typeface="+mn-ea"/>
+                <a:cs typeface="+mn-cs"/>
+              </a:defRPr>
+            </a:lvl5pPr>
+            <a:lvl6pPr marL="2286000" algn="l" defTabSz="914400" rtl="0" eaLnBrk="1" latinLnBrk="0" hangingPunct="1">
+              <a:defRPr sz="1800" kern="1200">
+                <a:solidFill>
+                  <a:schemeClr val="lt1"/>
+                </a:solidFill>
+                <a:latin typeface="+mn-lt"/>
+                <a:ea typeface="+mn-ea"/>
+                <a:cs typeface="+mn-cs"/>
+              </a:defRPr>
+            </a:lvl6pPr>
+            <a:lvl7pPr marL="2743200" algn="l" defTabSz="914400" rtl="0" eaLnBrk="1" latinLnBrk="0" hangingPunct="1">
+              <a:defRPr sz="1800" kern="1200">
+                <a:solidFill>
+                  <a:schemeClr val="lt1"/>
+                </a:solidFill>
+                <a:latin typeface="+mn-lt"/>
+                <a:ea typeface="+mn-ea"/>
+                <a:cs typeface="+mn-cs"/>
+              </a:defRPr>
+            </a:lvl7pPr>
+            <a:lvl8pPr marL="3200400" algn="l" defTabSz="914400" rtl="0" eaLnBrk="1" latinLnBrk="0" hangingPunct="1">
+              <a:defRPr sz="1800" kern="1200">
+                <a:solidFill>
+                  <a:schemeClr val="lt1"/>
+                </a:solidFill>
+                <a:latin typeface="+mn-lt"/>
+                <a:ea typeface="+mn-ea"/>
+                <a:cs typeface="+mn-cs"/>
+              </a:defRPr>
+            </a:lvl8pPr>
+            <a:lvl9pPr marL="3657600" algn="l" defTabSz="914400" rtl="0" eaLnBrk="1" latinLnBrk="0" hangingPunct="1">
+              <a:defRPr sz="1800" kern="1200">
+                <a:solidFill>
+                  <a:schemeClr val="lt1"/>
+                </a:solidFill>
+                <a:latin typeface="+mn-lt"/>
+                <a:ea typeface="+mn-ea"/>
+                <a:cs typeface="+mn-cs"/>
+              </a:defRPr>
+            </a:lvl9pPr>
+          </a:lstStyle>
+          <a:p>
+            <a:pPr algn="ctr"/>
+            <a:endParaRPr lang="en-US" dirty="0">
+              <a:solidFill>
+                <a:srgbClr val="FF6565"/>
+              </a:solidFill>
+            </a:endParaRPr>
+          </a:p>
+        </p:txBody>
+      </p:sp>
+      <p:sp>
+        <p:nvSpPr>
+          <p:cNvPr id="11" name="TextBox 19">
+            <a:extLst>
+              <a:ext uri="{FF2B5EF4-FFF2-40B4-BE49-F238E27FC236}">
+                <a16:creationId xmlns:a16="http://schemas.microsoft.com/office/drawing/2014/main" id="{E0CE4FB4-7162-4967-8152-144E3ED485D4}"/>
+              </a:ext>
+            </a:extLst>
+          </p:cNvPr>
+          <p:cNvSpPr txBox="1"/>
+          <p:nvPr/>
+        </p:nvSpPr>
+        <p:spPr>
+          <a:xfrm>
+            <a:off x="2653812" y="3277433"/>
+            <a:ext cx="1448957" cy="400110"/>
+          </a:xfrm>
+          <a:prstGeom prst="rect">
+            <a:avLst/>
+          </a:prstGeom>
+          <a:noFill/>
+        </p:spPr>
+        <p:txBody>
+          <a:bodyPr wrap="square" rtlCol="0">
+            <a:spAutoFit/>
+          </a:bodyPr>
+          <a:lstStyle>
+            <a:defPPr>
+              <a:defRPr lang="en-US"/>
+            </a:defPPr>
+            <a:lvl1pPr marL="0" algn="l" defTabSz="914400" rtl="0" eaLnBrk="1" latinLnBrk="0" hangingPunct="1">
+              <a:defRPr sz="1800" kern="1200">
+                <a:solidFill>
+                  <a:schemeClr val="tx1"/>
+                </a:solidFill>
+                <a:latin typeface="+mn-lt"/>
+                <a:ea typeface="+mn-ea"/>
+                <a:cs typeface="+mn-cs"/>
+              </a:defRPr>
+            </a:lvl1pPr>
+            <a:lvl2pPr marL="457200" algn="l" defTabSz="914400" rtl="0" eaLnBrk="1" latinLnBrk="0" hangingPunct="1">
+              <a:defRPr sz="1800" kern="1200">
+                <a:solidFill>
+                  <a:schemeClr val="tx1"/>
+                </a:solidFill>
+                <a:latin typeface="+mn-lt"/>
+                <a:ea typeface="+mn-ea"/>
+                <a:cs typeface="+mn-cs"/>
+              </a:defRPr>
+            </a:lvl2pPr>
+            <a:lvl3pPr marL="914400" algn="l" defTabSz="914400" rtl="0" eaLnBrk="1" latinLnBrk="0" hangingPunct="1">
+              <a:defRPr sz="1800" kern="1200">
+                <a:solidFill>
+                  <a:schemeClr val="tx1"/>
+                </a:solidFill>
+                <a:latin typeface="+mn-lt"/>
+                <a:ea typeface="+mn-ea"/>
+                <a:cs typeface="+mn-cs"/>
+              </a:defRPr>
+            </a:lvl3pPr>
+            <a:lvl4pPr marL="1371600" algn="l" defTabSz="914400" rtl="0" eaLnBrk="1" latinLnBrk="0" hangingPunct="1">
+              <a:defRPr sz="1800" kern="1200">
+                <a:solidFill>
+                  <a:schemeClr val="tx1"/>
+                </a:solidFill>
+                <a:latin typeface="+mn-lt"/>
+                <a:ea typeface="+mn-ea"/>
+                <a:cs typeface="+mn-cs"/>
+              </a:defRPr>
+            </a:lvl4pPr>
+            <a:lvl5pPr marL="1828800" algn="l" defTabSz="914400" rtl="0" eaLnBrk="1" latinLnBrk="0" hangingPunct="1">
+              <a:defRPr sz="1800" kern="1200">
+                <a:solidFill>
+                  <a:schemeClr val="tx1"/>
+                </a:solidFill>
+                <a:latin typeface="+mn-lt"/>
+                <a:ea typeface="+mn-ea"/>
+                <a:cs typeface="+mn-cs"/>
+              </a:defRPr>
+            </a:lvl5pPr>
+            <a:lvl6pPr marL="2286000" algn="l" defTabSz="914400" rtl="0" eaLnBrk="1" latinLnBrk="0" hangingPunct="1">
+              <a:defRPr sz="1800" kern="1200">
+                <a:solidFill>
+                  <a:schemeClr val="tx1"/>
+                </a:solidFill>
+                <a:latin typeface="+mn-lt"/>
+                <a:ea typeface="+mn-ea"/>
+                <a:cs typeface="+mn-cs"/>
+              </a:defRPr>
+            </a:lvl6pPr>
+            <a:lvl7pPr marL="2743200" algn="l" defTabSz="914400" rtl="0" eaLnBrk="1" latinLnBrk="0" hangingPunct="1">
+              <a:defRPr sz="1800" kern="1200">
+                <a:solidFill>
+                  <a:schemeClr val="tx1"/>
+                </a:solidFill>
+                <a:latin typeface="+mn-lt"/>
+                <a:ea typeface="+mn-ea"/>
+                <a:cs typeface="+mn-cs"/>
+              </a:defRPr>
+            </a:lvl7pPr>
+            <a:lvl8pPr marL="3200400" algn="l" defTabSz="914400" rtl="0" eaLnBrk="1" latinLnBrk="0" hangingPunct="1">
+              <a:defRPr sz="1800" kern="1200">
+                <a:solidFill>
+                  <a:schemeClr val="tx1"/>
+                </a:solidFill>
+                <a:latin typeface="+mn-lt"/>
+                <a:ea typeface="+mn-ea"/>
+                <a:cs typeface="+mn-cs"/>
+              </a:defRPr>
+            </a:lvl8pPr>
+            <a:lvl9pPr marL="3657600" algn="l" defTabSz="914400" rtl="0" eaLnBrk="1" latinLnBrk="0" hangingPunct="1">
+              <a:defRPr sz="1800" kern="1200">
+                <a:solidFill>
+                  <a:schemeClr val="tx1"/>
+                </a:solidFill>
+                <a:latin typeface="+mn-lt"/>
+                <a:ea typeface="+mn-ea"/>
+                <a:cs typeface="+mn-cs"/>
+              </a:defRPr>
+            </a:lvl9pPr>
+          </a:lstStyle>
+          <a:p>
+            <a:r>
+              <a:rPr lang="en-US" sz="2000" b="1" dirty="0"/>
+              <a:t>Unspecified</a:t>
+            </a:r>
+          </a:p>
+        </p:txBody>
+      </p:sp>
+    </p:spTree>
+    <p:extLst>
+      <p:ext uri="{BB962C8B-B14F-4D97-AF65-F5344CB8AC3E}">
+        <p14:creationId xmlns:p14="http://schemas.microsoft.com/office/powerpoint/2010/main" val="4174512251"/>
+      </p:ext>
+    </p:extLst>
+  </p:cSld>
+  <p:clrMapOvr>
+    <a:masterClrMapping/>
+  </p:clrMapOvr>
+</p:sld>
+</file>
+
+<file path=ppt/slides/slide4.xml><?xml version="1.0" encoding="utf-8"?>
+<p:sld xmlns:a="http://schemas.openxmlformats.org/drawingml/2006/main" xmlns:r="http://schemas.openxmlformats.org/officeDocument/2006/relationships" xmlns:p="http://schemas.openxmlformats.org/presentationml/2006/main">
+  <p:cSld>
+    <p:spTree>
+      <p:nvGrpSpPr>
+        <p:cNvPr id="1" name=""/>
+        <p:cNvGrpSpPr/>
+        <p:nvPr/>
+      </p:nvGrpSpPr>
+      <p:grpSpPr>
+        <a:xfrm>
+          <a:off x="0" y="0"/>
+          <a:ext cx="0" cy="0"/>
+          <a:chOff x="0" y="0"/>
+          <a:chExt cx="0" cy="0"/>
+        </a:xfrm>
+      </p:grpSpPr>
+      <p:sp>
+        <p:nvSpPr>
+          <p:cNvPr id="4" name="Rectangle 3">
+            <a:extLst>
+              <a:ext uri="{FF2B5EF4-FFF2-40B4-BE49-F238E27FC236}">
+                <a16:creationId xmlns:a16="http://schemas.microsoft.com/office/drawing/2014/main" id="{13929E8A-744F-4860-89A1-F7370FC9F240}"/>
+              </a:ext>
+            </a:extLst>
+          </p:cNvPr>
+          <p:cNvSpPr/>
+          <p:nvPr/>
+        </p:nvSpPr>
+        <p:spPr>
+          <a:xfrm>
+            <a:off x="1796681" y="1029021"/>
+            <a:ext cx="3292154" cy="1985849"/>
+          </a:xfrm>
+          <a:prstGeom prst="rect">
+            <a:avLst/>
+          </a:prstGeom>
+          <a:solidFill>
+            <a:schemeClr val="bg1"/>
+          </a:solidFill>
+          <a:ln w="38100">
+            <a:solidFill>
+              <a:schemeClr val="tx1"/>
+            </a:solidFill>
+          </a:ln>
+        </p:spPr>
+        <p:style>
+          <a:lnRef idx="2">
+            <a:schemeClr val="accent1">
+              <a:shade val="50000"/>
+            </a:schemeClr>
+          </a:lnRef>
+          <a:fillRef idx="1">
+            <a:schemeClr val="accent1"/>
+          </a:fillRef>
+          <a:effectRef idx="0">
+            <a:schemeClr val="accent1"/>
+          </a:effectRef>
+          <a:fontRef idx="minor">
+            <a:schemeClr val="lt1"/>
+          </a:fontRef>
+        </p:style>
+        <p:txBody>
+          <a:bodyPr rtlCol="0" anchor="ctr"/>
+          <a:lstStyle>
+            <a:defPPr>
+              <a:defRPr lang="en-US"/>
+            </a:defPPr>
+            <a:lvl1pPr marL="0" algn="l" defTabSz="914400" rtl="0" eaLnBrk="1" latinLnBrk="0" hangingPunct="1">
+              <a:defRPr sz="1800" kern="1200">
+                <a:solidFill>
+                  <a:schemeClr val="lt1"/>
+                </a:solidFill>
+                <a:latin typeface="+mn-lt"/>
+                <a:ea typeface="+mn-ea"/>
+                <a:cs typeface="+mn-cs"/>
+              </a:defRPr>
+            </a:lvl1pPr>
+            <a:lvl2pPr marL="457200" algn="l" defTabSz="914400" rtl="0" eaLnBrk="1" latinLnBrk="0" hangingPunct="1">
+              <a:defRPr sz="1800" kern="1200">
+                <a:solidFill>
+                  <a:schemeClr val="lt1"/>
+                </a:solidFill>
+                <a:latin typeface="+mn-lt"/>
+                <a:ea typeface="+mn-ea"/>
+                <a:cs typeface="+mn-cs"/>
+              </a:defRPr>
+            </a:lvl2pPr>
+            <a:lvl3pPr marL="914400" algn="l" defTabSz="914400" rtl="0" eaLnBrk="1" latinLnBrk="0" hangingPunct="1">
+              <a:defRPr sz="1800" kern="1200">
+                <a:solidFill>
+                  <a:schemeClr val="lt1"/>
+                </a:solidFill>
+                <a:latin typeface="+mn-lt"/>
+                <a:ea typeface="+mn-ea"/>
+                <a:cs typeface="+mn-cs"/>
+              </a:defRPr>
+            </a:lvl3pPr>
+            <a:lvl4pPr marL="1371600" algn="l" defTabSz="914400" rtl="0" eaLnBrk="1" latinLnBrk="0" hangingPunct="1">
+              <a:defRPr sz="1800" kern="1200">
+                <a:solidFill>
+                  <a:schemeClr val="lt1"/>
+                </a:solidFill>
+                <a:latin typeface="+mn-lt"/>
+                <a:ea typeface="+mn-ea"/>
+                <a:cs typeface="+mn-cs"/>
+              </a:defRPr>
+            </a:lvl4pPr>
+            <a:lvl5pPr marL="1828800" algn="l" defTabSz="914400" rtl="0" eaLnBrk="1" latinLnBrk="0" hangingPunct="1">
+              <a:defRPr sz="1800" kern="1200">
+                <a:solidFill>
+                  <a:schemeClr val="lt1"/>
+                </a:solidFill>
+                <a:latin typeface="+mn-lt"/>
+                <a:ea typeface="+mn-ea"/>
+                <a:cs typeface="+mn-cs"/>
+              </a:defRPr>
+            </a:lvl5pPr>
+            <a:lvl6pPr marL="2286000" algn="l" defTabSz="914400" rtl="0" eaLnBrk="1" latinLnBrk="0" hangingPunct="1">
+              <a:defRPr sz="1800" kern="1200">
+                <a:solidFill>
+                  <a:schemeClr val="lt1"/>
+                </a:solidFill>
+                <a:latin typeface="+mn-lt"/>
+                <a:ea typeface="+mn-ea"/>
+                <a:cs typeface="+mn-cs"/>
+              </a:defRPr>
+            </a:lvl6pPr>
+            <a:lvl7pPr marL="2743200" algn="l" defTabSz="914400" rtl="0" eaLnBrk="1" latinLnBrk="0" hangingPunct="1">
+              <a:defRPr sz="1800" kern="1200">
+                <a:solidFill>
+                  <a:schemeClr val="lt1"/>
+                </a:solidFill>
+                <a:latin typeface="+mn-lt"/>
+                <a:ea typeface="+mn-ea"/>
+                <a:cs typeface="+mn-cs"/>
+              </a:defRPr>
+            </a:lvl7pPr>
+            <a:lvl8pPr marL="3200400" algn="l" defTabSz="914400" rtl="0" eaLnBrk="1" latinLnBrk="0" hangingPunct="1">
+              <a:defRPr sz="1800" kern="1200">
+                <a:solidFill>
+                  <a:schemeClr val="lt1"/>
+                </a:solidFill>
+                <a:latin typeface="+mn-lt"/>
+                <a:ea typeface="+mn-ea"/>
+                <a:cs typeface="+mn-cs"/>
+              </a:defRPr>
+            </a:lvl8pPr>
+            <a:lvl9pPr marL="3657600" algn="l" defTabSz="914400" rtl="0" eaLnBrk="1" latinLnBrk="0" hangingPunct="1">
+              <a:defRPr sz="1800" kern="1200">
+                <a:solidFill>
+                  <a:schemeClr val="lt1"/>
+                </a:solidFill>
+                <a:latin typeface="+mn-lt"/>
+                <a:ea typeface="+mn-ea"/>
+                <a:cs typeface="+mn-cs"/>
+              </a:defRPr>
+            </a:lvl9pPr>
+          </a:lstStyle>
+          <a:p>
+            <a:pPr algn="ctr"/>
+            <a:endParaRPr lang="en-US"/>
+          </a:p>
+        </p:txBody>
+      </p:sp>
+      <p:sp>
+        <p:nvSpPr>
+          <p:cNvPr id="6" name="TextBox 10">
+            <a:extLst>
+              <a:ext uri="{FF2B5EF4-FFF2-40B4-BE49-F238E27FC236}">
+                <a16:creationId xmlns:a16="http://schemas.microsoft.com/office/drawing/2014/main" id="{EDA16992-9472-49CE-B254-9F8385A66CB9}"/>
+              </a:ext>
+            </a:extLst>
+          </p:cNvPr>
+          <p:cNvSpPr txBox="1"/>
+          <p:nvPr/>
+        </p:nvSpPr>
+        <p:spPr>
+          <a:xfrm>
+            <a:off x="2315882" y="1878135"/>
+            <a:ext cx="2256118" cy="400110"/>
+          </a:xfrm>
+          <a:prstGeom prst="rect">
+            <a:avLst/>
+          </a:prstGeom>
+          <a:noFill/>
+        </p:spPr>
+        <p:txBody>
+          <a:bodyPr wrap="square" rtlCol="0">
+            <a:spAutoFit/>
+          </a:bodyPr>
+          <a:lstStyle>
+            <a:defPPr>
+              <a:defRPr lang="en-US"/>
+            </a:defPPr>
+            <a:lvl1pPr marL="0" algn="l" defTabSz="914400" rtl="0" eaLnBrk="1" latinLnBrk="0" hangingPunct="1">
+              <a:defRPr sz="1800" kern="1200">
+                <a:solidFill>
+                  <a:schemeClr val="tx1"/>
+                </a:solidFill>
+                <a:latin typeface="+mn-lt"/>
+                <a:ea typeface="+mn-ea"/>
+                <a:cs typeface="+mn-cs"/>
+              </a:defRPr>
+            </a:lvl1pPr>
+            <a:lvl2pPr marL="457200" algn="l" defTabSz="914400" rtl="0" eaLnBrk="1" latinLnBrk="0" hangingPunct="1">
+              <a:defRPr sz="1800" kern="1200">
+                <a:solidFill>
+                  <a:schemeClr val="tx1"/>
+                </a:solidFill>
+                <a:latin typeface="+mn-lt"/>
+                <a:ea typeface="+mn-ea"/>
+                <a:cs typeface="+mn-cs"/>
+              </a:defRPr>
+            </a:lvl2pPr>
+            <a:lvl3pPr marL="914400" algn="l" defTabSz="914400" rtl="0" eaLnBrk="1" latinLnBrk="0" hangingPunct="1">
+              <a:defRPr sz="1800" kern="1200">
+                <a:solidFill>
+                  <a:schemeClr val="tx1"/>
+                </a:solidFill>
+                <a:latin typeface="+mn-lt"/>
+                <a:ea typeface="+mn-ea"/>
+                <a:cs typeface="+mn-cs"/>
+              </a:defRPr>
+            </a:lvl3pPr>
+            <a:lvl4pPr marL="1371600" algn="l" defTabSz="914400" rtl="0" eaLnBrk="1" latinLnBrk="0" hangingPunct="1">
+              <a:defRPr sz="1800" kern="1200">
+                <a:solidFill>
+                  <a:schemeClr val="tx1"/>
+                </a:solidFill>
+                <a:latin typeface="+mn-lt"/>
+                <a:ea typeface="+mn-ea"/>
+                <a:cs typeface="+mn-cs"/>
+              </a:defRPr>
+            </a:lvl4pPr>
+            <a:lvl5pPr marL="1828800" algn="l" defTabSz="914400" rtl="0" eaLnBrk="1" latinLnBrk="0" hangingPunct="1">
+              <a:defRPr sz="1800" kern="1200">
+                <a:solidFill>
+                  <a:schemeClr val="tx1"/>
+                </a:solidFill>
+                <a:latin typeface="+mn-lt"/>
+                <a:ea typeface="+mn-ea"/>
+                <a:cs typeface="+mn-cs"/>
+              </a:defRPr>
+            </a:lvl5pPr>
+            <a:lvl6pPr marL="2286000" algn="l" defTabSz="914400" rtl="0" eaLnBrk="1" latinLnBrk="0" hangingPunct="1">
+              <a:defRPr sz="1800" kern="1200">
+                <a:solidFill>
+                  <a:schemeClr val="tx1"/>
+                </a:solidFill>
+                <a:latin typeface="+mn-lt"/>
+                <a:ea typeface="+mn-ea"/>
+                <a:cs typeface="+mn-cs"/>
+              </a:defRPr>
+            </a:lvl6pPr>
+            <a:lvl7pPr marL="2743200" algn="l" defTabSz="914400" rtl="0" eaLnBrk="1" latinLnBrk="0" hangingPunct="1">
+              <a:defRPr sz="1800" kern="1200">
+                <a:solidFill>
+                  <a:schemeClr val="tx1"/>
+                </a:solidFill>
+                <a:latin typeface="+mn-lt"/>
+                <a:ea typeface="+mn-ea"/>
+                <a:cs typeface="+mn-cs"/>
+              </a:defRPr>
+            </a:lvl7pPr>
+            <a:lvl8pPr marL="3200400" algn="l" defTabSz="914400" rtl="0" eaLnBrk="1" latinLnBrk="0" hangingPunct="1">
+              <a:defRPr sz="1800" kern="1200">
+                <a:solidFill>
+                  <a:schemeClr val="tx1"/>
+                </a:solidFill>
+                <a:latin typeface="+mn-lt"/>
+                <a:ea typeface="+mn-ea"/>
+                <a:cs typeface="+mn-cs"/>
+              </a:defRPr>
+            </a:lvl8pPr>
+            <a:lvl9pPr marL="3657600" algn="l" defTabSz="914400" rtl="0" eaLnBrk="1" latinLnBrk="0" hangingPunct="1">
+              <a:defRPr sz="1800" kern="1200">
+                <a:solidFill>
+                  <a:schemeClr val="tx1"/>
+                </a:solidFill>
+                <a:latin typeface="+mn-lt"/>
+                <a:ea typeface="+mn-ea"/>
+                <a:cs typeface="+mn-cs"/>
+              </a:defRPr>
+            </a:lvl9pPr>
+          </a:lstStyle>
+          <a:p>
+            <a:r>
+              <a:rPr lang="en-US" sz="2000" b="1" dirty="0"/>
+              <a:t>Place of Use (POU)</a:t>
+            </a:r>
+          </a:p>
+        </p:txBody>
+      </p:sp>
+      <p:sp>
+        <p:nvSpPr>
+          <p:cNvPr id="7" name="TextBox 15">
+            <a:extLst>
+              <a:ext uri="{FF2B5EF4-FFF2-40B4-BE49-F238E27FC236}">
+                <a16:creationId xmlns:a16="http://schemas.microsoft.com/office/drawing/2014/main" id="{84BCE48D-1058-44F6-B615-EDF724AA8FDF}"/>
+              </a:ext>
+            </a:extLst>
+          </p:cNvPr>
+          <p:cNvSpPr txBox="1"/>
+          <p:nvPr/>
+        </p:nvSpPr>
+        <p:spPr>
+          <a:xfrm>
+            <a:off x="1797838" y="1029021"/>
+            <a:ext cx="3290997" cy="584775"/>
+          </a:xfrm>
+          <a:prstGeom prst="rect">
+            <a:avLst/>
+          </a:prstGeom>
+          <a:noFill/>
+        </p:spPr>
+        <p:txBody>
+          <a:bodyPr wrap="square" rtlCol="0">
+            <a:spAutoFit/>
+          </a:bodyPr>
+          <a:lstStyle>
+            <a:defPPr>
+              <a:defRPr lang="en-US"/>
+            </a:defPPr>
+            <a:lvl1pPr marL="0" algn="l" defTabSz="914400" rtl="0" eaLnBrk="1" latinLnBrk="0" hangingPunct="1">
+              <a:defRPr sz="1800" kern="1200">
+                <a:solidFill>
+                  <a:schemeClr val="tx1"/>
+                </a:solidFill>
+                <a:latin typeface="+mn-lt"/>
+                <a:ea typeface="+mn-ea"/>
+                <a:cs typeface="+mn-cs"/>
+              </a:defRPr>
+            </a:lvl1pPr>
+            <a:lvl2pPr marL="457200" algn="l" defTabSz="914400" rtl="0" eaLnBrk="1" latinLnBrk="0" hangingPunct="1">
+              <a:defRPr sz="1800" kern="1200">
+                <a:solidFill>
+                  <a:schemeClr val="tx1"/>
+                </a:solidFill>
+                <a:latin typeface="+mn-lt"/>
+                <a:ea typeface="+mn-ea"/>
+                <a:cs typeface="+mn-cs"/>
+              </a:defRPr>
+            </a:lvl2pPr>
+            <a:lvl3pPr marL="914400" algn="l" defTabSz="914400" rtl="0" eaLnBrk="1" latinLnBrk="0" hangingPunct="1">
+              <a:defRPr sz="1800" kern="1200">
+                <a:solidFill>
+                  <a:schemeClr val="tx1"/>
+                </a:solidFill>
+                <a:latin typeface="+mn-lt"/>
+                <a:ea typeface="+mn-ea"/>
+                <a:cs typeface="+mn-cs"/>
+              </a:defRPr>
+            </a:lvl3pPr>
+            <a:lvl4pPr marL="1371600" algn="l" defTabSz="914400" rtl="0" eaLnBrk="1" latinLnBrk="0" hangingPunct="1">
+              <a:defRPr sz="1800" kern="1200">
+                <a:solidFill>
+                  <a:schemeClr val="tx1"/>
+                </a:solidFill>
+                <a:latin typeface="+mn-lt"/>
+                <a:ea typeface="+mn-ea"/>
+                <a:cs typeface="+mn-cs"/>
+              </a:defRPr>
+            </a:lvl4pPr>
+            <a:lvl5pPr marL="1828800" algn="l" defTabSz="914400" rtl="0" eaLnBrk="1" latinLnBrk="0" hangingPunct="1">
+              <a:defRPr sz="1800" kern="1200">
+                <a:solidFill>
+                  <a:schemeClr val="tx1"/>
+                </a:solidFill>
+                <a:latin typeface="+mn-lt"/>
+                <a:ea typeface="+mn-ea"/>
+                <a:cs typeface="+mn-cs"/>
+              </a:defRPr>
+            </a:lvl5pPr>
+            <a:lvl6pPr marL="2286000" algn="l" defTabSz="914400" rtl="0" eaLnBrk="1" latinLnBrk="0" hangingPunct="1">
+              <a:defRPr sz="1800" kern="1200">
+                <a:solidFill>
+                  <a:schemeClr val="tx1"/>
+                </a:solidFill>
+                <a:latin typeface="+mn-lt"/>
+                <a:ea typeface="+mn-ea"/>
+                <a:cs typeface="+mn-cs"/>
+              </a:defRPr>
+            </a:lvl6pPr>
+            <a:lvl7pPr marL="2743200" algn="l" defTabSz="914400" rtl="0" eaLnBrk="1" latinLnBrk="0" hangingPunct="1">
+              <a:defRPr sz="1800" kern="1200">
+                <a:solidFill>
+                  <a:schemeClr val="tx1"/>
+                </a:solidFill>
+                <a:latin typeface="+mn-lt"/>
+                <a:ea typeface="+mn-ea"/>
+                <a:cs typeface="+mn-cs"/>
+              </a:defRPr>
+            </a:lvl7pPr>
+            <a:lvl8pPr marL="3200400" algn="l" defTabSz="914400" rtl="0" eaLnBrk="1" latinLnBrk="0" hangingPunct="1">
+              <a:defRPr sz="1800" kern="1200">
+                <a:solidFill>
+                  <a:schemeClr val="tx1"/>
+                </a:solidFill>
+                <a:latin typeface="+mn-lt"/>
+                <a:ea typeface="+mn-ea"/>
+                <a:cs typeface="+mn-cs"/>
+              </a:defRPr>
+            </a:lvl8pPr>
+            <a:lvl9pPr marL="3657600" algn="l" defTabSz="914400" rtl="0" eaLnBrk="1" latinLnBrk="0" hangingPunct="1">
+              <a:defRPr sz="1800" kern="1200">
+                <a:solidFill>
+                  <a:schemeClr val="tx1"/>
+                </a:solidFill>
+                <a:latin typeface="+mn-lt"/>
+                <a:ea typeface="+mn-ea"/>
+                <a:cs typeface="+mn-cs"/>
+              </a:defRPr>
+            </a:lvl9pPr>
+          </a:lstStyle>
+          <a:p>
+            <a:pPr algn="ctr"/>
+            <a:r>
+              <a:rPr lang="en-US" sz="3200" dirty="0">
+                <a:latin typeface="Arial Black" panose="020B0A04020102020204" pitchFamily="34" charset="0"/>
+              </a:rPr>
+              <a:t>Legend</a:t>
+            </a:r>
+          </a:p>
+        </p:txBody>
+      </p:sp>
+      <p:sp>
+        <p:nvSpPr>
+          <p:cNvPr id="9" name="TextBox 17">
+            <a:extLst>
+              <a:ext uri="{FF2B5EF4-FFF2-40B4-BE49-F238E27FC236}">
+                <a16:creationId xmlns:a16="http://schemas.microsoft.com/office/drawing/2014/main" id="{DAFB449A-8A63-4ADB-89D7-EC4CCF118C5C}"/>
+              </a:ext>
+            </a:extLst>
+          </p:cNvPr>
+          <p:cNvSpPr txBox="1"/>
+          <p:nvPr/>
+        </p:nvSpPr>
+        <p:spPr>
+          <a:xfrm>
+            <a:off x="2315881" y="2487383"/>
+            <a:ext cx="2839215" cy="400110"/>
+          </a:xfrm>
+          <a:prstGeom prst="rect">
+            <a:avLst/>
+          </a:prstGeom>
+          <a:noFill/>
+        </p:spPr>
+        <p:txBody>
+          <a:bodyPr wrap="square" rtlCol="0">
+            <a:spAutoFit/>
+          </a:bodyPr>
+          <a:lstStyle>
+            <a:defPPr>
+              <a:defRPr lang="en-US"/>
+            </a:defPPr>
+            <a:lvl1pPr marL="0" algn="l" defTabSz="914400" rtl="0" eaLnBrk="1" latinLnBrk="0" hangingPunct="1">
+              <a:defRPr sz="1800" kern="1200">
+                <a:solidFill>
+                  <a:schemeClr val="tx1"/>
+                </a:solidFill>
+                <a:latin typeface="+mn-lt"/>
+                <a:ea typeface="+mn-ea"/>
+                <a:cs typeface="+mn-cs"/>
+              </a:defRPr>
+            </a:lvl1pPr>
+            <a:lvl2pPr marL="457200" algn="l" defTabSz="914400" rtl="0" eaLnBrk="1" latinLnBrk="0" hangingPunct="1">
+              <a:defRPr sz="1800" kern="1200">
+                <a:solidFill>
+                  <a:schemeClr val="tx1"/>
+                </a:solidFill>
+                <a:latin typeface="+mn-lt"/>
+                <a:ea typeface="+mn-ea"/>
+                <a:cs typeface="+mn-cs"/>
+              </a:defRPr>
+            </a:lvl2pPr>
+            <a:lvl3pPr marL="914400" algn="l" defTabSz="914400" rtl="0" eaLnBrk="1" latinLnBrk="0" hangingPunct="1">
+              <a:defRPr sz="1800" kern="1200">
+                <a:solidFill>
+                  <a:schemeClr val="tx1"/>
+                </a:solidFill>
+                <a:latin typeface="+mn-lt"/>
+                <a:ea typeface="+mn-ea"/>
+                <a:cs typeface="+mn-cs"/>
+              </a:defRPr>
+            </a:lvl3pPr>
+            <a:lvl4pPr marL="1371600" algn="l" defTabSz="914400" rtl="0" eaLnBrk="1" latinLnBrk="0" hangingPunct="1">
+              <a:defRPr sz="1800" kern="1200">
+                <a:solidFill>
+                  <a:schemeClr val="tx1"/>
+                </a:solidFill>
+                <a:latin typeface="+mn-lt"/>
+                <a:ea typeface="+mn-ea"/>
+                <a:cs typeface="+mn-cs"/>
+              </a:defRPr>
+            </a:lvl4pPr>
+            <a:lvl5pPr marL="1828800" algn="l" defTabSz="914400" rtl="0" eaLnBrk="1" latinLnBrk="0" hangingPunct="1">
+              <a:defRPr sz="1800" kern="1200">
+                <a:solidFill>
+                  <a:schemeClr val="tx1"/>
+                </a:solidFill>
+                <a:latin typeface="+mn-lt"/>
+                <a:ea typeface="+mn-ea"/>
+                <a:cs typeface="+mn-cs"/>
+              </a:defRPr>
+            </a:lvl5pPr>
+            <a:lvl6pPr marL="2286000" algn="l" defTabSz="914400" rtl="0" eaLnBrk="1" latinLnBrk="0" hangingPunct="1">
+              <a:defRPr sz="1800" kern="1200">
+                <a:solidFill>
+                  <a:schemeClr val="tx1"/>
+                </a:solidFill>
+                <a:latin typeface="+mn-lt"/>
+                <a:ea typeface="+mn-ea"/>
+                <a:cs typeface="+mn-cs"/>
+              </a:defRPr>
+            </a:lvl6pPr>
+            <a:lvl7pPr marL="2743200" algn="l" defTabSz="914400" rtl="0" eaLnBrk="1" latinLnBrk="0" hangingPunct="1">
+              <a:defRPr sz="1800" kern="1200">
+                <a:solidFill>
+                  <a:schemeClr val="tx1"/>
+                </a:solidFill>
+                <a:latin typeface="+mn-lt"/>
+                <a:ea typeface="+mn-ea"/>
+                <a:cs typeface="+mn-cs"/>
+              </a:defRPr>
+            </a:lvl7pPr>
+            <a:lvl8pPr marL="3200400" algn="l" defTabSz="914400" rtl="0" eaLnBrk="1" latinLnBrk="0" hangingPunct="1">
+              <a:defRPr sz="1800" kern="1200">
+                <a:solidFill>
+                  <a:schemeClr val="tx1"/>
+                </a:solidFill>
+                <a:latin typeface="+mn-lt"/>
+                <a:ea typeface="+mn-ea"/>
+                <a:cs typeface="+mn-cs"/>
+              </a:defRPr>
+            </a:lvl8pPr>
+            <a:lvl9pPr marL="3657600" algn="l" defTabSz="914400" rtl="0" eaLnBrk="1" latinLnBrk="0" hangingPunct="1">
+              <a:defRPr sz="1800" kern="1200">
+                <a:solidFill>
+                  <a:schemeClr val="tx1"/>
+                </a:solidFill>
+                <a:latin typeface="+mn-lt"/>
+                <a:ea typeface="+mn-ea"/>
+                <a:cs typeface="+mn-cs"/>
+              </a:defRPr>
+            </a:lvl9pPr>
+          </a:lstStyle>
+          <a:p>
+            <a:r>
+              <a:rPr lang="en-US" sz="2000" b="1" dirty="0"/>
+              <a:t>Point of Diversion (POD)</a:t>
+            </a:r>
+          </a:p>
+        </p:txBody>
+      </p:sp>
+      <p:sp>
+        <p:nvSpPr>
+          <p:cNvPr id="2" name="Oval 1">
+            <a:extLst>
+              <a:ext uri="{FF2B5EF4-FFF2-40B4-BE49-F238E27FC236}">
+                <a16:creationId xmlns:a16="http://schemas.microsoft.com/office/drawing/2014/main" id="{E24DD160-94BE-DD8F-6CB7-8BE4120C47FC}"/>
+              </a:ext>
+            </a:extLst>
+          </p:cNvPr>
+          <p:cNvSpPr/>
+          <p:nvPr/>
+        </p:nvSpPr>
+        <p:spPr>
+          <a:xfrm>
+            <a:off x="1940776" y="2487383"/>
+            <a:ext cx="371856" cy="371856"/>
+          </a:xfrm>
+          <a:prstGeom prst="ellipse">
+            <a:avLst/>
+          </a:prstGeom>
+          <a:solidFill>
+            <a:srgbClr val="005AB5"/>
+          </a:solidFill>
+          <a:ln w="38100">
+            <a:solidFill>
+              <a:srgbClr val="005AB5"/>
+            </a:solidFill>
+          </a:ln>
+        </p:spPr>
+        <p:style>
+          <a:lnRef idx="2">
+            <a:schemeClr val="accent1">
+              <a:shade val="50000"/>
+            </a:schemeClr>
+          </a:lnRef>
+          <a:fillRef idx="1">
+            <a:schemeClr val="accent1"/>
+          </a:fillRef>
+          <a:effectRef idx="0">
+            <a:schemeClr val="accent1"/>
+          </a:effectRef>
+          <a:fontRef idx="minor">
+            <a:schemeClr val="lt1"/>
+          </a:fontRef>
+        </p:style>
+        <p:txBody>
+          <a:bodyPr rtlCol="0" anchor="ctr"/>
+          <a:lstStyle>
+            <a:defPPr>
+              <a:defRPr lang="en-US"/>
+            </a:defPPr>
+            <a:lvl1pPr marL="0" algn="l" defTabSz="914400" rtl="0" eaLnBrk="1" latinLnBrk="0" hangingPunct="1">
+              <a:defRPr sz="1800" kern="1200">
+                <a:solidFill>
+                  <a:schemeClr val="lt1"/>
+                </a:solidFill>
+                <a:latin typeface="+mn-lt"/>
+                <a:ea typeface="+mn-ea"/>
+                <a:cs typeface="+mn-cs"/>
+              </a:defRPr>
+            </a:lvl1pPr>
+            <a:lvl2pPr marL="457200" algn="l" defTabSz="914400" rtl="0" eaLnBrk="1" latinLnBrk="0" hangingPunct="1">
+              <a:defRPr sz="1800" kern="1200">
+                <a:solidFill>
+                  <a:schemeClr val="lt1"/>
+                </a:solidFill>
+                <a:latin typeface="+mn-lt"/>
+                <a:ea typeface="+mn-ea"/>
+                <a:cs typeface="+mn-cs"/>
+              </a:defRPr>
+            </a:lvl2pPr>
+            <a:lvl3pPr marL="914400" algn="l" defTabSz="914400" rtl="0" eaLnBrk="1" latinLnBrk="0" hangingPunct="1">
+              <a:defRPr sz="1800" kern="1200">
+                <a:solidFill>
+                  <a:schemeClr val="lt1"/>
+                </a:solidFill>
+                <a:latin typeface="+mn-lt"/>
+                <a:ea typeface="+mn-ea"/>
+                <a:cs typeface="+mn-cs"/>
+              </a:defRPr>
+            </a:lvl3pPr>
+            <a:lvl4pPr marL="1371600" algn="l" defTabSz="914400" rtl="0" eaLnBrk="1" latinLnBrk="0" hangingPunct="1">
+              <a:defRPr sz="1800" kern="1200">
+                <a:solidFill>
+                  <a:schemeClr val="lt1"/>
+                </a:solidFill>
+                <a:latin typeface="+mn-lt"/>
+                <a:ea typeface="+mn-ea"/>
+                <a:cs typeface="+mn-cs"/>
+              </a:defRPr>
+            </a:lvl4pPr>
+            <a:lvl5pPr marL="1828800" algn="l" defTabSz="914400" rtl="0" eaLnBrk="1" latinLnBrk="0" hangingPunct="1">
+              <a:defRPr sz="1800" kern="1200">
+                <a:solidFill>
+                  <a:schemeClr val="lt1"/>
+                </a:solidFill>
+                <a:latin typeface="+mn-lt"/>
+                <a:ea typeface="+mn-ea"/>
+                <a:cs typeface="+mn-cs"/>
+              </a:defRPr>
+            </a:lvl5pPr>
+            <a:lvl6pPr marL="2286000" algn="l" defTabSz="914400" rtl="0" eaLnBrk="1" latinLnBrk="0" hangingPunct="1">
+              <a:defRPr sz="1800" kern="1200">
+                <a:solidFill>
+                  <a:schemeClr val="lt1"/>
+                </a:solidFill>
+                <a:latin typeface="+mn-lt"/>
+                <a:ea typeface="+mn-ea"/>
+                <a:cs typeface="+mn-cs"/>
+              </a:defRPr>
+            </a:lvl6pPr>
+            <a:lvl7pPr marL="2743200" algn="l" defTabSz="914400" rtl="0" eaLnBrk="1" latinLnBrk="0" hangingPunct="1">
+              <a:defRPr sz="1800" kern="1200">
+                <a:solidFill>
+                  <a:schemeClr val="lt1"/>
+                </a:solidFill>
+                <a:latin typeface="+mn-lt"/>
+                <a:ea typeface="+mn-ea"/>
+                <a:cs typeface="+mn-cs"/>
+              </a:defRPr>
+            </a:lvl7pPr>
+            <a:lvl8pPr marL="3200400" algn="l" defTabSz="914400" rtl="0" eaLnBrk="1" latinLnBrk="0" hangingPunct="1">
+              <a:defRPr sz="1800" kern="1200">
+                <a:solidFill>
+                  <a:schemeClr val="lt1"/>
+                </a:solidFill>
+                <a:latin typeface="+mn-lt"/>
+                <a:ea typeface="+mn-ea"/>
+                <a:cs typeface="+mn-cs"/>
+              </a:defRPr>
+            </a:lvl8pPr>
+            <a:lvl9pPr marL="3657600" algn="l" defTabSz="914400" rtl="0" eaLnBrk="1" latinLnBrk="0" hangingPunct="1">
+              <a:defRPr sz="1800" kern="1200">
+                <a:solidFill>
+                  <a:schemeClr val="lt1"/>
+                </a:solidFill>
+                <a:latin typeface="+mn-lt"/>
+                <a:ea typeface="+mn-ea"/>
+                <a:cs typeface="+mn-cs"/>
+              </a:defRPr>
+            </a:lvl9pPr>
+          </a:lstStyle>
+          <a:p>
+            <a:pPr algn="ctr"/>
+            <a:endParaRPr lang="en-US" dirty="0">
+              <a:solidFill>
+                <a:srgbClr val="FF6565"/>
+              </a:solidFill>
+            </a:endParaRPr>
+          </a:p>
+        </p:txBody>
+      </p:sp>
+      <p:sp>
+        <p:nvSpPr>
+          <p:cNvPr id="3" name="Rectangle 2">
+            <a:extLst>
+              <a:ext uri="{FF2B5EF4-FFF2-40B4-BE49-F238E27FC236}">
+                <a16:creationId xmlns:a16="http://schemas.microsoft.com/office/drawing/2014/main" id="{C6B05BC8-C854-11D2-AB2F-5E89188A0DE7}"/>
+              </a:ext>
+            </a:extLst>
+          </p:cNvPr>
+          <p:cNvSpPr/>
+          <p:nvPr/>
+        </p:nvSpPr>
+        <p:spPr>
+          <a:xfrm>
+            <a:off x="1940776" y="1902157"/>
+            <a:ext cx="397899" cy="412175"/>
+          </a:xfrm>
+          <a:prstGeom prst="rect">
+            <a:avLst/>
+          </a:prstGeom>
+          <a:solidFill>
+            <a:srgbClr val="DC3220"/>
+          </a:solidFill>
+          <a:ln>
+            <a:solidFill>
+              <a:srgbClr val="DC3220"/>
+            </a:solidFill>
+          </a:ln>
+        </p:spPr>
+        <p:style>
+          <a:lnRef idx="2">
+            <a:schemeClr val="accent1">
+              <a:shade val="50000"/>
+            </a:schemeClr>
+          </a:lnRef>
+          <a:fillRef idx="1">
+            <a:schemeClr val="accent1"/>
+          </a:fillRef>
+          <a:effectRef idx="0">
+            <a:schemeClr val="accent1"/>
+          </a:effectRef>
+          <a:fontRef idx="minor">
+            <a:schemeClr val="lt1"/>
+          </a:fontRef>
+        </p:style>
+        <p:txBody>
+          <a:bodyPr rtlCol="0" anchor="ctr"/>
+          <a:lstStyle/>
+          <a:p>
+            <a:pPr algn="ctr"/>
+            <a:endParaRPr lang="en-US"/>
+          </a:p>
+        </p:txBody>
+      </p:sp>
+    </p:spTree>
+    <p:extLst>
+      <p:ext uri="{BB962C8B-B14F-4D97-AF65-F5344CB8AC3E}">
+        <p14:creationId xmlns:p14="http://schemas.microsoft.com/office/powerpoint/2010/main" val="2910567615"/>
+      </p:ext>
+    </p:extLst>
+  </p:cSld>
+  <p:clrMapOvr>
+    <a:masterClrMapping/>
+  </p:clrMapOvr>
+</p:sld>
+</file>
+
 <file path=ppt/theme/theme1.xml><?xml version="1.0" encoding="utf-8"?>
 <a:theme xmlns:a="http://schemas.openxmlformats.org/drawingml/2006/main" name="Office Theme">
   <a:themeElements>

</xml_diff>